<commit_message>
Updated presentation - added code
</commit_message>
<xml_diff>
--- a/Breakout3b/kreeger_north_20190816.pptx
+++ b/Breakout3b/kreeger_north_20190816.pptx
@@ -5,7 +5,7 @@
     <p:sldMasterId id="2147483702" r:id="rId1"/>
   </p:sldMasterIdLst>
   <p:notesMasterIdLst>
-    <p:notesMasterId r:id="rId10"/>
+    <p:notesMasterId r:id="rId17"/>
   </p:notesMasterIdLst>
   <p:sldIdLst>
     <p:sldId id="256" r:id="rId2"/>
@@ -14,8 +14,15 @@
     <p:sldId id="260" r:id="rId5"/>
     <p:sldId id="263" r:id="rId6"/>
     <p:sldId id="264" r:id="rId7"/>
-    <p:sldId id="262" r:id="rId8"/>
-    <p:sldId id="261" r:id="rId9"/>
+    <p:sldId id="270" r:id="rId8"/>
+    <p:sldId id="272" r:id="rId9"/>
+    <p:sldId id="273" r:id="rId10"/>
+    <p:sldId id="274" r:id="rId11"/>
+    <p:sldId id="271" r:id="rId12"/>
+    <p:sldId id="262" r:id="rId13"/>
+    <p:sldId id="261" r:id="rId14"/>
+    <p:sldId id="266" r:id="rId15"/>
+    <p:sldId id="265" r:id="rId16"/>
   </p:sldIdLst>
   <p:sldSz cx="12192000" cy="6858000"/>
   <p:notesSz cx="6858000" cy="9144000"/>
@@ -114,6 +121,14 @@
       </a:defRPr>
     </a:lvl9pPr>
   </p:defaultTextStyle>
+  <p:extLst>
+    <p:ext uri="{EFAFB233-063F-42B5-8137-9DF3F51BA10A}">
+      <p15:sldGuideLst xmlns:p15="http://schemas.microsoft.com/office/powerpoint/2012/main"/>
+    </p:ext>
+    <p:ext uri="{2D200454-40CA-4A62-9FC3-DE9A4176ACB9}">
+      <p15:notesGuideLst xmlns:p15="http://schemas.microsoft.com/office/powerpoint/2012/main"/>
+    </p:ext>
+  </p:extLst>
 </p:presentation>
 </file>
 
@@ -199,7 +214,7 @@
           <a:p>
             <a:fld id="{5ED66DC5-DD5B-48CE-B695-9D8868605B20}" type="datetimeFigureOut">
               <a:rPr lang="en-US" smtClean="0"/>
-              <a:t>8/14/2019</a:t>
+              <a:t>8/16/2019</a:t>
             </a:fld>
             <a:endParaRPr lang="en-US"/>
           </a:p>
@@ -738,6 +753,47 @@
               </a:rPr>
               <a:t>. Thus, an obvious drawback of this split of our dataset in two parts is that we only have half of the data to train the base models and half of the data to train the meta-model. In order to overcome this limitation, we can however follow some kind of “k-fold cross-training” approach (similar to what is done in k-fold cross-validation) such that all the observations can be used to train the meta-model: for any observation, the prediction of the weak learners are done with instances of these weak learners trained on the k-1 folds that do not contain the considered observation. In other words, it consists in training on k-1 fold in order to make predictions on the remaining fold and that iteratively so that to obtain predictions for observations in any folds. Doing so, we can produce relevant predictions for each observation of our dataset and then train our meta-model on all these predictions.</a:t>
             </a:r>
+          </a:p>
+          <a:p>
+            <a:endParaRPr lang="en-US" sz="1200" b="0" i="0" kern="1200" dirty="0">
+              <a:solidFill>
+                <a:schemeClr val="tx1"/>
+              </a:solidFill>
+              <a:effectLst/>
+              <a:latin typeface="+mn-lt"/>
+              <a:ea typeface="+mn-ea"/>
+              <a:cs typeface="+mn-cs"/>
+            </a:endParaRPr>
+          </a:p>
+          <a:p>
+            <a:r>
+              <a:rPr lang="en-US" sz="1200" b="0" i="0" kern="1200" dirty="0">
+                <a:solidFill>
+                  <a:schemeClr val="tx1"/>
+                </a:solidFill>
+                <a:effectLst/>
+                <a:latin typeface="+mn-lt"/>
+                <a:ea typeface="+mn-ea"/>
+                <a:cs typeface="+mn-cs"/>
+              </a:rPr>
+              <a:t>So, how do you tune the hyper parameters of the stacked model? Regarding the base models, we can tune their hyper parameters using Cross-Validation + Grid Search just like we did earlier. It doesn’t really matter what folds we use, but it’s usually convenient to use the same folds that we use for stacking. Tuning the hyper parameters of the stacked model is where things get interesting. In practice most people (including myself) simply use Cross Validation + Grid Search using the same exact CV folds used to generate the Meta Features. There’s a subtle flaw to this approach – can you spot it?</a:t>
+            </a:r>
+          </a:p>
+          <a:p>
+            <a:r>
+              <a:rPr lang="en-US" sz="1200" b="0" i="0" kern="1200" dirty="0">
+                <a:solidFill>
+                  <a:schemeClr val="tx1"/>
+                </a:solidFill>
+                <a:effectLst/>
+                <a:latin typeface="+mn-lt"/>
+                <a:ea typeface="+mn-ea"/>
+                <a:cs typeface="+mn-cs"/>
+              </a:rPr>
+              <a:t>Indeed, there’s a small bit of data leakage in our stacking CV procedure. Consider the 1st round of Cross Validation for the stacked model. We fit a model S to {fold2, fold3, fold4, fold5}, make predictions on fold1 and evaluate performance. But the meta features in {fold2, fold3, fold4, fold5} are dependent on the target values in fold1. So, the target values we’re trying to predict are themselves embedded into the features we’re using to fit our model. This is leakage and in theory S could deduce information about the target values from the meta features in a way that would cause it to overfit the training data and not generalize well to out-of-bag samples. However, you have to work hard to conjure up an example where this leakage is significant enough to cause the stacked model to overfit. In practice, everyone ignores this theoretical hole (and frankly I think most people are unaware it even exists!).</a:t>
+            </a:r>
+          </a:p>
+          <a:p>
             <a:endParaRPr lang="en-US" dirty="0"/>
           </a:p>
         </p:txBody>
@@ -769,6 +825,205 @@
     <p:extLst>
       <p:ext uri="{BB962C8B-B14F-4D97-AF65-F5344CB8AC3E}">
         <p14:creationId xmlns:p14="http://schemas.microsoft.com/office/powerpoint/2010/main" val="4115943928"/>
+      </p:ext>
+    </p:extLst>
+  </p:cSld>
+  <p:clrMapOvr>
+    <a:masterClrMapping/>
+  </p:clrMapOvr>
+</p:notes>
+</file>
+
+<file path=ppt/notesSlides/notesSlide3.xml><?xml version="1.0" encoding="utf-8"?>
+<p:notes xmlns:a="http://schemas.openxmlformats.org/drawingml/2006/main" xmlns:r="http://schemas.openxmlformats.org/officeDocument/2006/relationships" xmlns:p="http://schemas.openxmlformats.org/presentationml/2006/main">
+  <p:cSld>
+    <p:spTree>
+      <p:nvGrpSpPr>
+        <p:cNvPr id="1" name=""/>
+        <p:cNvGrpSpPr/>
+        <p:nvPr/>
+      </p:nvGrpSpPr>
+      <p:grpSpPr>
+        <a:xfrm>
+          <a:off x="0" y="0"/>
+          <a:ext cx="0" cy="0"/>
+          <a:chOff x="0" y="0"/>
+          <a:chExt cx="0" cy="0"/>
+        </a:xfrm>
+      </p:grpSpPr>
+      <p:sp>
+        <p:nvSpPr>
+          <p:cNvPr id="2" name="Slide Image Placeholder 1"/>
+          <p:cNvSpPr>
+            <a:spLocks noGrp="1" noRot="1" noChangeAspect="1"/>
+          </p:cNvSpPr>
+          <p:nvPr>
+            <p:ph type="sldImg"/>
+          </p:nvPr>
+        </p:nvSpPr>
+        <p:spPr/>
+      </p:sp>
+      <p:sp>
+        <p:nvSpPr>
+          <p:cNvPr id="3" name="Notes Placeholder 2"/>
+          <p:cNvSpPr>
+            <a:spLocks noGrp="1"/>
+          </p:cNvSpPr>
+          <p:nvPr>
+            <p:ph type="body" idx="1"/>
+          </p:nvPr>
+        </p:nvSpPr>
+        <p:spPr/>
+        <p:txBody>
+          <a:bodyPr/>
+          <a:lstStyle/>
+          <a:p>
+            <a:r>
+              <a:rPr lang="en-US" dirty="0"/>
+              <a:t>Outcomes is vector of target</a:t>
+            </a:r>
+          </a:p>
+        </p:txBody>
+      </p:sp>
+      <p:sp>
+        <p:nvSpPr>
+          <p:cNvPr id="4" name="Slide Number Placeholder 3"/>
+          <p:cNvSpPr>
+            <a:spLocks noGrp="1"/>
+          </p:cNvSpPr>
+          <p:nvPr>
+            <p:ph type="sldNum" sz="quarter" idx="10"/>
+          </p:nvPr>
+        </p:nvSpPr>
+        <p:spPr/>
+        <p:txBody>
+          <a:bodyPr/>
+          <a:lstStyle/>
+          <a:p>
+            <a:fld id="{B9B750E8-0F95-448B-94DD-941207294918}" type="slidenum">
+              <a:rPr lang="en-US" smtClean="0"/>
+              <a:t>8</a:t>
+            </a:fld>
+            <a:endParaRPr lang="en-US"/>
+          </a:p>
+        </p:txBody>
+      </p:sp>
+    </p:spTree>
+    <p:extLst>
+      <p:ext uri="{BB962C8B-B14F-4D97-AF65-F5344CB8AC3E}">
+        <p14:creationId xmlns:p14="http://schemas.microsoft.com/office/powerpoint/2010/main" val="2442182486"/>
+      </p:ext>
+    </p:extLst>
+  </p:cSld>
+  <p:clrMapOvr>
+    <a:masterClrMapping/>
+  </p:clrMapOvr>
+</p:notes>
+</file>
+
+<file path=ppt/notesSlides/notesSlide4.xml><?xml version="1.0" encoding="utf-8"?>
+<p:notes xmlns:a="http://schemas.openxmlformats.org/drawingml/2006/main" xmlns:r="http://schemas.openxmlformats.org/officeDocument/2006/relationships" xmlns:p="http://schemas.openxmlformats.org/presentationml/2006/main">
+  <p:cSld>
+    <p:spTree>
+      <p:nvGrpSpPr>
+        <p:cNvPr id="1" name=""/>
+        <p:cNvGrpSpPr/>
+        <p:nvPr/>
+      </p:nvGrpSpPr>
+      <p:grpSpPr>
+        <a:xfrm>
+          <a:off x="0" y="0"/>
+          <a:ext cx="0" cy="0"/>
+          <a:chOff x="0" y="0"/>
+          <a:chExt cx="0" cy="0"/>
+        </a:xfrm>
+      </p:grpSpPr>
+      <p:sp>
+        <p:nvSpPr>
+          <p:cNvPr id="2" name="Slide Image Placeholder 1"/>
+          <p:cNvSpPr>
+            <a:spLocks noGrp="1" noRot="1" noChangeAspect="1"/>
+          </p:cNvSpPr>
+          <p:nvPr>
+            <p:ph type="sldImg"/>
+          </p:nvPr>
+        </p:nvSpPr>
+        <p:spPr/>
+      </p:sp>
+      <p:sp>
+        <p:nvSpPr>
+          <p:cNvPr id="3" name="Notes Placeholder 2"/>
+          <p:cNvSpPr>
+            <a:spLocks noGrp="1"/>
+          </p:cNvSpPr>
+          <p:nvPr>
+            <p:ph type="body" idx="1"/>
+          </p:nvPr>
+        </p:nvSpPr>
+        <p:spPr/>
+        <p:txBody>
+          <a:bodyPr/>
+          <a:lstStyle/>
+          <a:p>
+            <a:r>
+              <a:rPr lang="en-US" sz="1200" b="0" i="0" kern="1200" dirty="0">
+                <a:solidFill>
+                  <a:schemeClr val="tx1"/>
+                </a:solidFill>
+                <a:effectLst/>
+                <a:latin typeface="+mn-lt"/>
+                <a:ea typeface="+mn-ea"/>
+                <a:cs typeface="+mn-cs"/>
+              </a:rPr>
+              <a:t>So, how do you tune the hyper parameters of the stacked model? Regarding the base models, we can tune their hyper parameters using Cross-Validation + Grid Search just like we did earlier. It doesn’t really matter what folds we use, but it’s usually convenient to use the same folds that we use for stacking. Tuning the hyper parameters of the stacked model is where things get interesting. In practice most people (including myself) simply use Cross Validation + Grid Search using the same exact CV folds used to generate the Meta Features. There’s a subtle flaw to this approach – can you spot it?</a:t>
+            </a:r>
+          </a:p>
+          <a:p>
+            <a:r>
+              <a:rPr lang="en-US" sz="1200" b="0" i="0" kern="1200" dirty="0">
+                <a:solidFill>
+                  <a:schemeClr val="tx1"/>
+                </a:solidFill>
+                <a:effectLst/>
+                <a:latin typeface="+mn-lt"/>
+                <a:ea typeface="+mn-ea"/>
+                <a:cs typeface="+mn-cs"/>
+              </a:rPr>
+              <a:t>Indeed, there’s a small bit of data leakage in our stacking CV procedure. Consider the 1st round of Cross Validation for the stacked model. We fit a model S to {fold2, fold3, fold4, fold5}, make predictions on fold1 and evaluate performance. But the meta features in {fold2, fold3, fold4, fold5} are dependent on the target values in fold1. So, the target values we’re trying to predict are themselves embedded into the features we’re using to fit our model. This is leakage and in theory S could deduce information about the target values from the meta features in a way that would cause it to overfit the training data and not generalize well to out-of-bag samples. However, you have to work hard to conjure up an example where this leakage is significant enough to cause the stacked model to overfit. In practice, everyone ignores this theoretical hole (and frankly I think most people are unaware it even exists!).</a:t>
+            </a:r>
+          </a:p>
+          <a:p>
+            <a:endParaRPr lang="en-US" dirty="0"/>
+          </a:p>
+        </p:txBody>
+      </p:sp>
+      <p:sp>
+        <p:nvSpPr>
+          <p:cNvPr id="4" name="Slide Number Placeholder 3"/>
+          <p:cNvSpPr>
+            <a:spLocks noGrp="1"/>
+          </p:cNvSpPr>
+          <p:nvPr>
+            <p:ph type="sldNum" sz="quarter" idx="10"/>
+          </p:nvPr>
+        </p:nvSpPr>
+        <p:spPr/>
+        <p:txBody>
+          <a:bodyPr/>
+          <a:lstStyle/>
+          <a:p>
+            <a:fld id="{B9B750E8-0F95-448B-94DD-941207294918}" type="slidenum">
+              <a:rPr lang="en-US" smtClean="0"/>
+              <a:t>11</a:t>
+            </a:fld>
+            <a:endParaRPr lang="en-US"/>
+          </a:p>
+        </p:txBody>
+      </p:sp>
+    </p:spTree>
+    <p:extLst>
+      <p:ext uri="{BB962C8B-B14F-4D97-AF65-F5344CB8AC3E}">
+        <p14:creationId xmlns:p14="http://schemas.microsoft.com/office/powerpoint/2010/main" val="3629276578"/>
       </p:ext>
     </p:extLst>
   </p:cSld>
@@ -1004,7 +1259,7 @@
           <a:p>
             <a:fld id="{5C39EBB0-92B9-4013-9008-B21BA0368AFC}" type="datetimeFigureOut">
               <a:rPr lang="en-US" smtClean="0"/>
-              <a:t>8/14/2019</a:t>
+              <a:t>8/16/2019</a:t>
             </a:fld>
             <a:endParaRPr lang="en-US"/>
           </a:p>
@@ -1212,7 +1467,7 @@
           <a:p>
             <a:fld id="{5C39EBB0-92B9-4013-9008-B21BA0368AFC}" type="datetimeFigureOut">
               <a:rPr lang="en-US" smtClean="0"/>
-              <a:t>8/14/2019</a:t>
+              <a:t>8/16/2019</a:t>
             </a:fld>
             <a:endParaRPr lang="en-US"/>
           </a:p>
@@ -1468,7 +1723,7 @@
           <a:p>
             <a:fld id="{5C39EBB0-92B9-4013-9008-B21BA0368AFC}" type="datetimeFigureOut">
               <a:rPr lang="en-US" smtClean="0"/>
-              <a:t>8/14/2019</a:t>
+              <a:t>8/16/2019</a:t>
             </a:fld>
             <a:endParaRPr lang="en-US"/>
           </a:p>
@@ -1638,7 +1893,7 @@
           <a:p>
             <a:fld id="{5C39EBB0-92B9-4013-9008-B21BA0368AFC}" type="datetimeFigureOut">
               <a:rPr lang="en-US" smtClean="0"/>
-              <a:t>8/14/2019</a:t>
+              <a:t>8/16/2019</a:t>
             </a:fld>
             <a:endParaRPr lang="en-US"/>
           </a:p>
@@ -1981,7 +2236,7 @@
           <a:p>
             <a:fld id="{5C39EBB0-92B9-4013-9008-B21BA0368AFC}" type="datetimeFigureOut">
               <a:rPr lang="en-US" smtClean="0"/>
-              <a:t>8/14/2019</a:t>
+              <a:t>8/16/2019</a:t>
             </a:fld>
             <a:endParaRPr lang="en-US"/>
           </a:p>
@@ -2256,7 +2511,7 @@
           <a:p>
             <a:fld id="{5C39EBB0-92B9-4013-9008-B21BA0368AFC}" type="datetimeFigureOut">
               <a:rPr lang="en-US" smtClean="0"/>
-              <a:t>8/14/2019</a:t>
+              <a:t>8/16/2019</a:t>
             </a:fld>
             <a:endParaRPr lang="en-US"/>
           </a:p>
@@ -2635,7 +2890,7 @@
           <a:p>
             <a:fld id="{5C39EBB0-92B9-4013-9008-B21BA0368AFC}" type="datetimeFigureOut">
               <a:rPr lang="en-US" smtClean="0"/>
-              <a:t>8/14/2019</a:t>
+              <a:t>8/16/2019</a:t>
             </a:fld>
             <a:endParaRPr lang="en-US"/>
           </a:p>
@@ -2753,7 +3008,7 @@
           <a:p>
             <a:fld id="{5C39EBB0-92B9-4013-9008-B21BA0368AFC}" type="datetimeFigureOut">
               <a:rPr lang="en-US" smtClean="0"/>
-              <a:t>8/14/2019</a:t>
+              <a:t>8/16/2019</a:t>
             </a:fld>
             <a:endParaRPr lang="en-US"/>
           </a:p>
@@ -2924,7 +3179,7 @@
           <a:p>
             <a:fld id="{5C39EBB0-92B9-4013-9008-B21BA0368AFC}" type="datetimeFigureOut">
               <a:rPr lang="en-US" smtClean="0"/>
-              <a:t>8/14/2019</a:t>
+              <a:t>8/16/2019</a:t>
             </a:fld>
             <a:endParaRPr lang="en-US"/>
           </a:p>
@@ -3278,7 +3533,7 @@
           <a:p>
             <a:fld id="{5C39EBB0-92B9-4013-9008-B21BA0368AFC}" type="datetimeFigureOut">
               <a:rPr lang="en-US" smtClean="0"/>
-              <a:t>8/14/2019</a:t>
+              <a:t>8/16/2019</a:t>
             </a:fld>
             <a:endParaRPr lang="en-US"/>
           </a:p>
@@ -3655,7 +3910,7 @@
           <a:p>
             <a:fld id="{5C39EBB0-92B9-4013-9008-B21BA0368AFC}" type="datetimeFigureOut">
               <a:rPr lang="en-US" smtClean="0"/>
-              <a:t>8/14/2019</a:t>
+              <a:t>8/16/2019</a:t>
             </a:fld>
             <a:endParaRPr lang="en-US"/>
           </a:p>
@@ -3942,7 +4197,7 @@
           <a:p>
             <a:fld id="{5C39EBB0-92B9-4013-9008-B21BA0368AFC}" type="datetimeFigureOut">
               <a:rPr lang="en-US" smtClean="0"/>
-              <a:t>8/14/2019</a:t>
+              <a:t>8/16/2019</a:t>
             </a:fld>
             <a:endParaRPr lang="en-US"/>
           </a:p>
@@ -4596,6 +4851,1024 @@
 </p:sld>
 </file>
 
+<file path=ppt/slides/slide10.xml><?xml version="1.0" encoding="utf-8"?>
+<p:sld xmlns:a="http://schemas.openxmlformats.org/drawingml/2006/main" xmlns:r="http://schemas.openxmlformats.org/officeDocument/2006/relationships" xmlns:p="http://schemas.openxmlformats.org/presentationml/2006/main">
+  <p:cSld>
+    <p:spTree>
+      <p:nvGrpSpPr>
+        <p:cNvPr id="1" name=""/>
+        <p:cNvGrpSpPr/>
+        <p:nvPr/>
+      </p:nvGrpSpPr>
+      <p:grpSpPr>
+        <a:xfrm>
+          <a:off x="0" y="0"/>
+          <a:ext cx="0" cy="0"/>
+          <a:chOff x="0" y="0"/>
+          <a:chExt cx="0" cy="0"/>
+        </a:xfrm>
+      </p:grpSpPr>
+      <p:sp>
+        <p:nvSpPr>
+          <p:cNvPr id="2" name="TextBox 1">
+            <a:extLst>
+              <a:ext uri="{FF2B5EF4-FFF2-40B4-BE49-F238E27FC236}">
+                <a16:creationId xmlns:a16="http://schemas.microsoft.com/office/drawing/2014/main" id="{97ECCCB0-93C9-40C8-B23C-E358523E0630}"/>
+              </a:ext>
+            </a:extLst>
+          </p:cNvPr>
+          <p:cNvSpPr txBox="1"/>
+          <p:nvPr/>
+        </p:nvSpPr>
+        <p:spPr>
+          <a:xfrm>
+            <a:off x="934948" y="1263721"/>
+            <a:ext cx="9482083" cy="3231654"/>
+          </a:xfrm>
+          <a:prstGeom prst="rect">
+            <a:avLst/>
+          </a:prstGeom>
+          <a:noFill/>
+        </p:spPr>
+        <p:txBody>
+          <a:bodyPr wrap="none" rtlCol="0">
+            <a:spAutoFit/>
+          </a:bodyPr>
+          <a:lstStyle/>
+          <a:p>
+            <a:r>
+              <a:rPr lang="en-US" sz="1200" dirty="0">
+                <a:latin typeface="Courier New" panose="02070309020205020404" pitchFamily="49" charset="0"/>
+                <a:cs typeface="Courier New" panose="02070309020205020404" pitchFamily="49" charset="0"/>
+              </a:rPr>
+              <a:t># Best model</a:t>
+            </a:r>
+          </a:p>
+          <a:p>
+            <a:r>
+              <a:rPr lang="en-US" sz="1200" dirty="0" err="1">
+                <a:latin typeface="Courier New" panose="02070309020205020404" pitchFamily="49" charset="0"/>
+                <a:cs typeface="Courier New" panose="02070309020205020404" pitchFamily="49" charset="0"/>
+              </a:rPr>
+              <a:t>ind.best</a:t>
+            </a:r>
+            <a:r>
+              <a:rPr lang="en-US" sz="1200" dirty="0">
+                <a:latin typeface="Courier New" panose="02070309020205020404" pitchFamily="49" charset="0"/>
+                <a:cs typeface="Courier New" panose="02070309020205020404" pitchFamily="49" charset="0"/>
+              </a:rPr>
+              <a:t> &lt;- </a:t>
+            </a:r>
+            <a:r>
+              <a:rPr lang="en-US" sz="1200" dirty="0" err="1">
+                <a:latin typeface="Courier New" panose="02070309020205020404" pitchFamily="49" charset="0"/>
+                <a:cs typeface="Courier New" panose="02070309020205020404" pitchFamily="49" charset="0"/>
+              </a:rPr>
+              <a:t>which.min</a:t>
+            </a:r>
+            <a:r>
+              <a:rPr lang="en-US" sz="1200" dirty="0">
+                <a:latin typeface="Courier New" panose="02070309020205020404" pitchFamily="49" charset="0"/>
+                <a:cs typeface="Courier New" panose="02070309020205020404" pitchFamily="49" charset="0"/>
+              </a:rPr>
+              <a:t>(</a:t>
+            </a:r>
+            <a:r>
+              <a:rPr lang="en-US" sz="1200" dirty="0" err="1">
+                <a:latin typeface="Courier New" panose="02070309020205020404" pitchFamily="49" charset="0"/>
+                <a:cs typeface="Courier New" panose="02070309020205020404" pitchFamily="49" charset="0"/>
+              </a:rPr>
+              <a:t>cv.results$RMSE</a:t>
+            </a:r>
+            <a:r>
+              <a:rPr lang="en-US" sz="1200" dirty="0">
+                <a:latin typeface="Courier New" panose="02070309020205020404" pitchFamily="49" charset="0"/>
+                <a:cs typeface="Courier New" panose="02070309020205020404" pitchFamily="49" charset="0"/>
+              </a:rPr>
+              <a:t>)</a:t>
+            </a:r>
+          </a:p>
+          <a:p>
+            <a:r>
+              <a:rPr lang="en-US" sz="1200" dirty="0" err="1">
+                <a:latin typeface="Courier New" panose="02070309020205020404" pitchFamily="49" charset="0"/>
+                <a:cs typeface="Courier New" panose="02070309020205020404" pitchFamily="49" charset="0"/>
+              </a:rPr>
+              <a:t>gamma.best</a:t>
+            </a:r>
+            <a:r>
+              <a:rPr lang="en-US" sz="1200" dirty="0">
+                <a:latin typeface="Courier New" panose="02070309020205020404" pitchFamily="49" charset="0"/>
+                <a:cs typeface="Courier New" panose="02070309020205020404" pitchFamily="49" charset="0"/>
+              </a:rPr>
+              <a:t> &lt;- </a:t>
+            </a:r>
+            <a:r>
+              <a:rPr lang="en-US" sz="1200" dirty="0" err="1">
+                <a:latin typeface="Courier New" panose="02070309020205020404" pitchFamily="49" charset="0"/>
+                <a:cs typeface="Courier New" panose="02070309020205020404" pitchFamily="49" charset="0"/>
+              </a:rPr>
+              <a:t>cv.results</a:t>
+            </a:r>
+            <a:r>
+              <a:rPr lang="en-US" sz="1200" dirty="0">
+                <a:latin typeface="Courier New" panose="02070309020205020404" pitchFamily="49" charset="0"/>
+                <a:cs typeface="Courier New" panose="02070309020205020404" pitchFamily="49" charset="0"/>
+              </a:rPr>
+              <a:t>[ind.best,1]; </a:t>
+            </a:r>
+            <a:r>
+              <a:rPr lang="en-US" sz="1200" dirty="0" err="1">
+                <a:latin typeface="Courier New" panose="02070309020205020404" pitchFamily="49" charset="0"/>
+                <a:cs typeface="Courier New" panose="02070309020205020404" pitchFamily="49" charset="0"/>
+              </a:rPr>
+              <a:t>cost.best</a:t>
+            </a:r>
+            <a:r>
+              <a:rPr lang="en-US" sz="1200" dirty="0">
+                <a:latin typeface="Courier New" panose="02070309020205020404" pitchFamily="49" charset="0"/>
+                <a:cs typeface="Courier New" panose="02070309020205020404" pitchFamily="49" charset="0"/>
+              </a:rPr>
+              <a:t> &lt;- </a:t>
+            </a:r>
+            <a:r>
+              <a:rPr lang="en-US" sz="1200" dirty="0" err="1">
+                <a:latin typeface="Courier New" panose="02070309020205020404" pitchFamily="49" charset="0"/>
+                <a:cs typeface="Courier New" panose="02070309020205020404" pitchFamily="49" charset="0"/>
+              </a:rPr>
+              <a:t>cv.results</a:t>
+            </a:r>
+            <a:r>
+              <a:rPr lang="en-US" sz="1200" dirty="0">
+                <a:latin typeface="Courier New" panose="02070309020205020404" pitchFamily="49" charset="0"/>
+                <a:cs typeface="Courier New" panose="02070309020205020404" pitchFamily="49" charset="0"/>
+              </a:rPr>
+              <a:t>[ind.best,2]</a:t>
+            </a:r>
+          </a:p>
+          <a:p>
+            <a:r>
+              <a:rPr lang="en-US" sz="1200" dirty="0" err="1">
+                <a:latin typeface="Courier New" panose="02070309020205020404" pitchFamily="49" charset="0"/>
+                <a:cs typeface="Courier New" panose="02070309020205020404" pitchFamily="49" charset="0"/>
+              </a:rPr>
+              <a:t>epsilon.best</a:t>
+            </a:r>
+            <a:r>
+              <a:rPr lang="en-US" sz="1200" dirty="0">
+                <a:latin typeface="Courier New" panose="02070309020205020404" pitchFamily="49" charset="0"/>
+                <a:cs typeface="Courier New" panose="02070309020205020404" pitchFamily="49" charset="0"/>
+              </a:rPr>
+              <a:t> &lt;- </a:t>
+            </a:r>
+            <a:r>
+              <a:rPr lang="en-US" sz="1200" dirty="0" err="1">
+                <a:latin typeface="Courier New" panose="02070309020205020404" pitchFamily="49" charset="0"/>
+                <a:cs typeface="Courier New" panose="02070309020205020404" pitchFamily="49" charset="0"/>
+              </a:rPr>
+              <a:t>cv.results</a:t>
+            </a:r>
+            <a:r>
+              <a:rPr lang="en-US" sz="1200" dirty="0">
+                <a:latin typeface="Courier New" panose="02070309020205020404" pitchFamily="49" charset="0"/>
+                <a:cs typeface="Courier New" panose="02070309020205020404" pitchFamily="49" charset="0"/>
+              </a:rPr>
+              <a:t>[ind.best,3]</a:t>
+            </a:r>
+          </a:p>
+          <a:p>
+            <a:endParaRPr lang="en-US" sz="1200" dirty="0">
+              <a:latin typeface="Courier New" panose="02070309020205020404" pitchFamily="49" charset="0"/>
+              <a:cs typeface="Courier New" panose="02070309020205020404" pitchFamily="49" charset="0"/>
+            </a:endParaRPr>
+          </a:p>
+          <a:p>
+            <a:r>
+              <a:rPr lang="en-US" sz="1200" dirty="0">
+                <a:latin typeface="Courier New" panose="02070309020205020404" pitchFamily="49" charset="0"/>
+                <a:cs typeface="Courier New" panose="02070309020205020404" pitchFamily="49" charset="0"/>
+              </a:rPr>
+              <a:t># Reference (no </a:t>
+            </a:r>
+            <a:r>
+              <a:rPr lang="en-US" sz="1200" dirty="0" err="1">
+                <a:latin typeface="Courier New" panose="02070309020205020404" pitchFamily="49" charset="0"/>
+                <a:cs typeface="Courier New" panose="02070309020205020404" pitchFamily="49" charset="0"/>
+              </a:rPr>
+              <a:t>reomval</a:t>
+            </a:r>
+            <a:r>
+              <a:rPr lang="en-US" sz="1200" dirty="0">
+                <a:latin typeface="Courier New" panose="02070309020205020404" pitchFamily="49" charset="0"/>
+                <a:cs typeface="Courier New" panose="02070309020205020404" pitchFamily="49" charset="0"/>
+              </a:rPr>
+              <a:t> of outliers beyond </a:t>
+            </a:r>
+            <a:r>
+              <a:rPr lang="en-US" sz="1200" dirty="0" err="1">
+                <a:latin typeface="Courier New" panose="02070309020205020404" pitchFamily="49" charset="0"/>
+                <a:cs typeface="Courier New" panose="02070309020205020404" pitchFamily="49" charset="0"/>
+              </a:rPr>
+              <a:t>GrLivArea</a:t>
+            </a:r>
+            <a:r>
+              <a:rPr lang="en-US" sz="1200" dirty="0">
+                <a:latin typeface="Courier New" panose="02070309020205020404" pitchFamily="49" charset="0"/>
+                <a:cs typeface="Courier New" panose="02070309020205020404" pitchFamily="49" charset="0"/>
+              </a:rPr>
+              <a:t>)</a:t>
+            </a:r>
+          </a:p>
+          <a:p>
+            <a:r>
+              <a:rPr lang="en-US" sz="1200" dirty="0">
+                <a:latin typeface="Courier New" panose="02070309020205020404" pitchFamily="49" charset="0"/>
+                <a:cs typeface="Courier New" panose="02070309020205020404" pitchFamily="49" charset="0"/>
+              </a:rPr>
+              <a:t>#gamma  cost   epsilon      RMSE</a:t>
+            </a:r>
+          </a:p>
+          <a:p>
+            <a:r>
+              <a:rPr lang="en-US" sz="1200" dirty="0">
+                <a:latin typeface="Courier New" panose="02070309020205020404" pitchFamily="49" charset="0"/>
+                <a:cs typeface="Courier New" panose="02070309020205020404" pitchFamily="49" charset="0"/>
+              </a:rPr>
+              <a:t>#1e-04  100    0.01    0.1120517</a:t>
+            </a:r>
+          </a:p>
+          <a:p>
+            <a:r>
+              <a:rPr lang="en-US" sz="1200" dirty="0">
+                <a:latin typeface="Courier New" panose="02070309020205020404" pitchFamily="49" charset="0"/>
+                <a:cs typeface="Courier New" panose="02070309020205020404" pitchFamily="49" charset="0"/>
+              </a:rPr>
+              <a:t>#</a:t>
+            </a:r>
+          </a:p>
+          <a:p>
+            <a:r>
+              <a:rPr lang="en-US" sz="1200" dirty="0">
+                <a:latin typeface="Courier New" panose="02070309020205020404" pitchFamily="49" charset="0"/>
+                <a:cs typeface="Courier New" panose="02070309020205020404" pitchFamily="49" charset="0"/>
+              </a:rPr>
+              <a:t># Same parameters after removal of outliers. RMSE becomes 0.1064619</a:t>
+            </a:r>
+          </a:p>
+          <a:p>
+            <a:endParaRPr lang="en-US" sz="1200" dirty="0">
+              <a:latin typeface="Courier New" panose="02070309020205020404" pitchFamily="49" charset="0"/>
+              <a:cs typeface="Courier New" panose="02070309020205020404" pitchFamily="49" charset="0"/>
+            </a:endParaRPr>
+          </a:p>
+          <a:p>
+            <a:r>
+              <a:rPr lang="en-US" sz="1200" dirty="0">
+                <a:latin typeface="Courier New" panose="02070309020205020404" pitchFamily="49" charset="0"/>
+                <a:cs typeface="Courier New" panose="02070309020205020404" pitchFamily="49" charset="0"/>
+              </a:rPr>
+              <a:t># Final Model fit</a:t>
+            </a:r>
+          </a:p>
+          <a:p>
+            <a:r>
+              <a:rPr lang="en-US" sz="1200" dirty="0" err="1">
+                <a:latin typeface="Courier New" panose="02070309020205020404" pitchFamily="49" charset="0"/>
+                <a:cs typeface="Courier New" panose="02070309020205020404" pitchFamily="49" charset="0"/>
+              </a:rPr>
+              <a:t>mod.svm</a:t>
+            </a:r>
+            <a:r>
+              <a:rPr lang="en-US" sz="1200" dirty="0">
+                <a:latin typeface="Courier New" panose="02070309020205020404" pitchFamily="49" charset="0"/>
+                <a:cs typeface="Courier New" panose="02070309020205020404" pitchFamily="49" charset="0"/>
+              </a:rPr>
+              <a:t> &lt;- </a:t>
+            </a:r>
+            <a:r>
+              <a:rPr lang="en-US" sz="1200" dirty="0" err="1">
+                <a:latin typeface="Courier New" panose="02070309020205020404" pitchFamily="49" charset="0"/>
+                <a:cs typeface="Courier New" panose="02070309020205020404" pitchFamily="49" charset="0"/>
+              </a:rPr>
+              <a:t>svm</a:t>
+            </a:r>
+            <a:r>
+              <a:rPr lang="en-US" sz="1200" dirty="0">
+                <a:latin typeface="Courier New" panose="02070309020205020404" pitchFamily="49" charset="0"/>
+                <a:cs typeface="Courier New" panose="02070309020205020404" pitchFamily="49" charset="0"/>
+              </a:rPr>
+              <a:t>(x = </a:t>
+            </a:r>
+            <a:r>
+              <a:rPr lang="en-US" sz="1200" dirty="0" err="1">
+                <a:latin typeface="Courier New" panose="02070309020205020404" pitchFamily="49" charset="0"/>
+                <a:cs typeface="Courier New" panose="02070309020205020404" pitchFamily="49" charset="0"/>
+              </a:rPr>
+              <a:t>as.matrix</a:t>
+            </a:r>
+            <a:r>
+              <a:rPr lang="en-US" sz="1200" dirty="0">
+                <a:latin typeface="Courier New" panose="02070309020205020404" pitchFamily="49" charset="0"/>
+                <a:cs typeface="Courier New" panose="02070309020205020404" pitchFamily="49" charset="0"/>
+              </a:rPr>
+              <a:t>(</a:t>
+            </a:r>
+            <a:r>
+              <a:rPr lang="en-US" sz="1200" dirty="0" err="1">
+                <a:latin typeface="Courier New" panose="02070309020205020404" pitchFamily="49" charset="0"/>
+                <a:cs typeface="Courier New" panose="02070309020205020404" pitchFamily="49" charset="0"/>
+              </a:rPr>
+              <a:t>trainSparse</a:t>
+            </a:r>
+            <a:r>
+              <a:rPr lang="en-US" sz="1200" dirty="0">
+                <a:latin typeface="Courier New" panose="02070309020205020404" pitchFamily="49" charset="0"/>
+                <a:cs typeface="Courier New" panose="02070309020205020404" pitchFamily="49" charset="0"/>
+              </a:rPr>
+              <a:t>), y = outcomes, type = "eps-regression", kernel = "radial",</a:t>
+            </a:r>
+          </a:p>
+          <a:p>
+            <a:r>
+              <a:rPr lang="en-US" sz="1200" dirty="0">
+                <a:latin typeface="Courier New" panose="02070309020205020404" pitchFamily="49" charset="0"/>
+                <a:cs typeface="Courier New" panose="02070309020205020404" pitchFamily="49" charset="0"/>
+              </a:rPr>
+              <a:t>                cost = 100, gamma = 1e-4, epsilon = 0.01)</a:t>
+            </a:r>
+          </a:p>
+          <a:p>
+            <a:endParaRPr lang="en-US" sz="1200" dirty="0">
+              <a:latin typeface="Courier New" panose="02070309020205020404" pitchFamily="49" charset="0"/>
+              <a:cs typeface="Courier New" panose="02070309020205020404" pitchFamily="49" charset="0"/>
+            </a:endParaRPr>
+          </a:p>
+          <a:p>
+            <a:r>
+              <a:rPr lang="en-US" sz="1200" dirty="0">
+                <a:latin typeface="Courier New" panose="02070309020205020404" pitchFamily="49" charset="0"/>
+                <a:cs typeface="Courier New" panose="02070309020205020404" pitchFamily="49" charset="0"/>
+              </a:rPr>
+              <a:t># Predict</a:t>
+            </a:r>
+          </a:p>
+          <a:p>
+            <a:r>
+              <a:rPr lang="en-US" sz="1200" dirty="0" err="1">
+                <a:latin typeface="Courier New" panose="02070309020205020404" pitchFamily="49" charset="0"/>
+                <a:cs typeface="Courier New" panose="02070309020205020404" pitchFamily="49" charset="0"/>
+              </a:rPr>
+              <a:t>predTest</a:t>
+            </a:r>
+            <a:r>
+              <a:rPr lang="en-US" sz="1200" dirty="0">
+                <a:latin typeface="Courier New" panose="02070309020205020404" pitchFamily="49" charset="0"/>
+                <a:cs typeface="Courier New" panose="02070309020205020404" pitchFamily="49" charset="0"/>
+              </a:rPr>
+              <a:t> &lt;- predict(</a:t>
+            </a:r>
+            <a:r>
+              <a:rPr lang="en-US" sz="1200" dirty="0" err="1">
+                <a:latin typeface="Courier New" panose="02070309020205020404" pitchFamily="49" charset="0"/>
+                <a:cs typeface="Courier New" panose="02070309020205020404" pitchFamily="49" charset="0"/>
+              </a:rPr>
+              <a:t>mod.svm</a:t>
+            </a:r>
+            <a:r>
+              <a:rPr lang="en-US" sz="1200" dirty="0">
+                <a:latin typeface="Courier New" panose="02070309020205020404" pitchFamily="49" charset="0"/>
+                <a:cs typeface="Courier New" panose="02070309020205020404" pitchFamily="49" charset="0"/>
+              </a:rPr>
+              <a:t>, </a:t>
+            </a:r>
+            <a:r>
+              <a:rPr lang="en-US" sz="1200" dirty="0" err="1">
+                <a:latin typeface="Courier New" panose="02070309020205020404" pitchFamily="49" charset="0"/>
+                <a:cs typeface="Courier New" panose="02070309020205020404" pitchFamily="49" charset="0"/>
+              </a:rPr>
+              <a:t>newdata</a:t>
+            </a:r>
+            <a:r>
+              <a:rPr lang="en-US" sz="1200" dirty="0">
+                <a:latin typeface="Courier New" panose="02070309020205020404" pitchFamily="49" charset="0"/>
+                <a:cs typeface="Courier New" panose="02070309020205020404" pitchFamily="49" charset="0"/>
+              </a:rPr>
+              <a:t> = </a:t>
+            </a:r>
+            <a:r>
+              <a:rPr lang="en-US" sz="1200" dirty="0" err="1">
+                <a:latin typeface="Courier New" panose="02070309020205020404" pitchFamily="49" charset="0"/>
+                <a:cs typeface="Courier New" panose="02070309020205020404" pitchFamily="49" charset="0"/>
+              </a:rPr>
+              <a:t>as.matrix</a:t>
+            </a:r>
+            <a:r>
+              <a:rPr lang="en-US" sz="1200" dirty="0">
+                <a:latin typeface="Courier New" panose="02070309020205020404" pitchFamily="49" charset="0"/>
+                <a:cs typeface="Courier New" panose="02070309020205020404" pitchFamily="49" charset="0"/>
+              </a:rPr>
+              <a:t>(</a:t>
+            </a:r>
+            <a:r>
+              <a:rPr lang="en-US" sz="1200" dirty="0" err="1">
+                <a:latin typeface="Courier New" panose="02070309020205020404" pitchFamily="49" charset="0"/>
+                <a:cs typeface="Courier New" panose="02070309020205020404" pitchFamily="49" charset="0"/>
+              </a:rPr>
+              <a:t>testSparse</a:t>
+            </a:r>
+            <a:r>
+              <a:rPr lang="en-US" sz="1200" dirty="0">
+                <a:latin typeface="Courier New" panose="02070309020205020404" pitchFamily="49" charset="0"/>
+                <a:cs typeface="Courier New" panose="02070309020205020404" pitchFamily="49" charset="0"/>
+              </a:rPr>
+              <a:t>))</a:t>
+            </a:r>
+          </a:p>
+        </p:txBody>
+      </p:sp>
+    </p:spTree>
+    <p:extLst>
+      <p:ext uri="{BB962C8B-B14F-4D97-AF65-F5344CB8AC3E}">
+        <p14:creationId xmlns:p14="http://schemas.microsoft.com/office/powerpoint/2010/main" val="65668622"/>
+      </p:ext>
+    </p:extLst>
+  </p:cSld>
+  <p:clrMapOvr>
+    <a:masterClrMapping/>
+  </p:clrMapOvr>
+</p:sld>
+</file>
+
+<file path=ppt/slides/slide11.xml><?xml version="1.0" encoding="utf-8"?>
+<p:sld xmlns:a="http://schemas.openxmlformats.org/drawingml/2006/main" xmlns:r="http://schemas.openxmlformats.org/officeDocument/2006/relationships" xmlns:p="http://schemas.openxmlformats.org/presentationml/2006/main">
+  <p:cSld>
+    <p:spTree>
+      <p:nvGrpSpPr>
+        <p:cNvPr id="1" name=""/>
+        <p:cNvGrpSpPr/>
+        <p:nvPr/>
+      </p:nvGrpSpPr>
+      <p:grpSpPr>
+        <a:xfrm>
+          <a:off x="0" y="0"/>
+          <a:ext cx="0" cy="0"/>
+          <a:chOff x="0" y="0"/>
+          <a:chExt cx="0" cy="0"/>
+        </a:xfrm>
+      </p:grpSpPr>
+      <p:sp>
+        <p:nvSpPr>
+          <p:cNvPr id="2" name="Title 1">
+            <a:extLst>
+              <a:ext uri="{FF2B5EF4-FFF2-40B4-BE49-F238E27FC236}">
+                <a16:creationId xmlns:a16="http://schemas.microsoft.com/office/drawing/2014/main" id="{1E78C141-99AC-4F0C-9DC2-CE33F64EDD63}"/>
+              </a:ext>
+            </a:extLst>
+          </p:cNvPr>
+          <p:cNvSpPr>
+            <a:spLocks noGrp="1"/>
+          </p:cNvSpPr>
+          <p:nvPr>
+            <p:ph type="title"/>
+          </p:nvPr>
+        </p:nvSpPr>
+        <p:spPr/>
+        <p:txBody>
+          <a:bodyPr/>
+          <a:lstStyle/>
+          <a:p>
+            <a:r>
+              <a:rPr lang="en-US" dirty="0"/>
+              <a:t>Example - Darts</a:t>
+            </a:r>
+          </a:p>
+        </p:txBody>
+      </p:sp>
+      <p:sp>
+        <p:nvSpPr>
+          <p:cNvPr id="3" name="Content Placeholder 2">
+            <a:extLst>
+              <a:ext uri="{FF2B5EF4-FFF2-40B4-BE49-F238E27FC236}">
+                <a16:creationId xmlns:a16="http://schemas.microsoft.com/office/drawing/2014/main" id="{CA8F8E7B-D982-4843-9B1D-1CC74E1D0719}"/>
+              </a:ext>
+            </a:extLst>
+          </p:cNvPr>
+          <p:cNvSpPr>
+            <a:spLocks noGrp="1"/>
+          </p:cNvSpPr>
+          <p:nvPr>
+            <p:ph idx="1"/>
+          </p:nvPr>
+        </p:nvSpPr>
+        <p:spPr/>
+        <p:txBody>
+          <a:bodyPr/>
+          <a:lstStyle/>
+          <a:p>
+            <a:r>
+              <a:rPr lang="en-US" dirty="0"/>
+              <a:t>Once base learners have been determined, fit each base model to full training set and make predictions on test data.</a:t>
+            </a:r>
+          </a:p>
+          <a:p>
+            <a:endParaRPr lang="en-US" dirty="0"/>
+          </a:p>
+          <a:p>
+            <a:pPr marL="0" indent="0">
+              <a:buNone/>
+            </a:pPr>
+            <a:r>
+              <a:rPr lang="en-US" dirty="0"/>
+              <a:t>Finally, fit a new stacked model on updated training and test data.</a:t>
+            </a:r>
+          </a:p>
+          <a:p>
+            <a:pPr marL="0" indent="0">
+              <a:buNone/>
+            </a:pPr>
+            <a:endParaRPr lang="en-US" dirty="0"/>
+          </a:p>
+          <a:p>
+            <a:pPr marL="0" indent="0">
+              <a:buNone/>
+            </a:pPr>
+            <a:r>
+              <a:rPr lang="en-US" dirty="0"/>
+              <a:t>Should we be concerned about data leakage?</a:t>
+            </a:r>
+          </a:p>
+        </p:txBody>
+      </p:sp>
+    </p:spTree>
+    <p:extLst>
+      <p:ext uri="{BB962C8B-B14F-4D97-AF65-F5344CB8AC3E}">
+        <p14:creationId xmlns:p14="http://schemas.microsoft.com/office/powerpoint/2010/main" val="2634250923"/>
+      </p:ext>
+    </p:extLst>
+  </p:cSld>
+  <p:clrMapOvr>
+    <a:masterClrMapping/>
+  </p:clrMapOvr>
+</p:sld>
+</file>
+
+<file path=ppt/slides/slide12.xml><?xml version="1.0" encoding="utf-8"?>
+<p:sld xmlns:a="http://schemas.openxmlformats.org/drawingml/2006/main" xmlns:r="http://schemas.openxmlformats.org/officeDocument/2006/relationships" xmlns:p="http://schemas.openxmlformats.org/presentationml/2006/main">
+  <p:cSld>
+    <p:spTree>
+      <p:nvGrpSpPr>
+        <p:cNvPr id="1" name=""/>
+        <p:cNvGrpSpPr/>
+        <p:nvPr/>
+      </p:nvGrpSpPr>
+      <p:grpSpPr>
+        <a:xfrm>
+          <a:off x="0" y="0"/>
+          <a:ext cx="0" cy="0"/>
+          <a:chOff x="0" y="0"/>
+          <a:chExt cx="0" cy="0"/>
+        </a:xfrm>
+      </p:grpSpPr>
+      <p:sp>
+        <p:nvSpPr>
+          <p:cNvPr id="2" name="Title 1">
+            <a:extLst>
+              <a:ext uri="{FF2B5EF4-FFF2-40B4-BE49-F238E27FC236}">
+                <a16:creationId xmlns:a16="http://schemas.microsoft.com/office/drawing/2014/main" id="{3FFAD1F2-6553-4FB1-9A7F-A0C60E667FAF}"/>
+              </a:ext>
+            </a:extLst>
+          </p:cNvPr>
+          <p:cNvSpPr>
+            <a:spLocks noGrp="1"/>
+          </p:cNvSpPr>
+          <p:nvPr>
+            <p:ph type="title"/>
+          </p:nvPr>
+        </p:nvSpPr>
+        <p:spPr/>
+        <p:txBody>
+          <a:bodyPr/>
+          <a:lstStyle/>
+          <a:p>
+            <a:r>
+              <a:rPr lang="en-US" dirty="0"/>
+              <a:t>Takeaways</a:t>
+            </a:r>
+          </a:p>
+        </p:txBody>
+      </p:sp>
+      <p:sp>
+        <p:nvSpPr>
+          <p:cNvPr id="3" name="Content Placeholder 2">
+            <a:extLst>
+              <a:ext uri="{FF2B5EF4-FFF2-40B4-BE49-F238E27FC236}">
+                <a16:creationId xmlns:a16="http://schemas.microsoft.com/office/drawing/2014/main" id="{08222B6B-4412-427A-B273-5C275872E363}"/>
+              </a:ext>
+            </a:extLst>
+          </p:cNvPr>
+          <p:cNvSpPr>
+            <a:spLocks noGrp="1"/>
+          </p:cNvSpPr>
+          <p:nvPr>
+            <p:ph idx="1"/>
+          </p:nvPr>
+        </p:nvSpPr>
+        <p:spPr/>
+        <p:txBody>
+          <a:bodyPr>
+            <a:normAutofit/>
+          </a:bodyPr>
+          <a:lstStyle/>
+          <a:p>
+            <a:pPr marL="225425" indent="-225425">
+              <a:buFont typeface="Courier New" panose="02070309020205020404" pitchFamily="49" charset="0"/>
+              <a:buChar char="o"/>
+            </a:pPr>
+            <a:r>
+              <a:rPr lang="en-US" dirty="0"/>
+              <a:t>Ensemble learning is a machine learning paradigm where multiple models (often called weak learners or base models) are trained to solve the same problem and combined to get better performances</a:t>
+            </a:r>
+          </a:p>
+          <a:p>
+            <a:pPr marL="225425" indent="-225425">
+              <a:buFont typeface="Courier New" panose="02070309020205020404" pitchFamily="49" charset="0"/>
+              <a:buChar char="o"/>
+            </a:pPr>
+            <a:r>
+              <a:rPr lang="en-US" dirty="0"/>
+              <a:t>The main hypothesis is that if </a:t>
+            </a:r>
+            <a:r>
+              <a:rPr lang="en-US" dirty="0">
+                <a:solidFill>
+                  <a:srgbClr val="00B0F0"/>
+                </a:solidFill>
+              </a:rPr>
+              <a:t>we combine the weak learners the right way </a:t>
+            </a:r>
+            <a:r>
+              <a:rPr lang="en-US" dirty="0"/>
+              <a:t>we can obtain more accurate and/or robust models</a:t>
+            </a:r>
+          </a:p>
+          <a:p>
+            <a:pPr marL="225425" indent="-225425">
+              <a:buFont typeface="Courier New" panose="02070309020205020404" pitchFamily="49" charset="0"/>
+              <a:buChar char="o"/>
+            </a:pPr>
+            <a:r>
+              <a:rPr lang="en-US" dirty="0"/>
+              <a:t>In </a:t>
+            </a:r>
+            <a:r>
+              <a:rPr lang="en-US" dirty="0">
+                <a:solidFill>
+                  <a:srgbClr val="00B050"/>
+                </a:solidFill>
+              </a:rPr>
+              <a:t>bagging methods</a:t>
+            </a:r>
+            <a:r>
+              <a:rPr lang="en-US" dirty="0"/>
+              <a:t>, several instance of the </a:t>
+            </a:r>
+            <a:r>
+              <a:rPr lang="en-US" b="1" dirty="0"/>
+              <a:t>same base model </a:t>
+            </a:r>
+            <a:r>
+              <a:rPr lang="en-US" dirty="0"/>
+              <a:t>are trained in parallel (independently from each others) on different bootstrap samples and then aggregated in some kind of “averaging” process</a:t>
+            </a:r>
+          </a:p>
+          <a:p>
+            <a:pPr marL="225425" indent="-225425">
+              <a:buFont typeface="Courier New" panose="02070309020205020404" pitchFamily="49" charset="0"/>
+              <a:buChar char="o"/>
+            </a:pPr>
+            <a:r>
+              <a:rPr lang="en-US" dirty="0"/>
+              <a:t>The kind of averaging operation done over the (almost) </a:t>
+            </a:r>
+            <a:r>
+              <a:rPr lang="en-US" dirty="0" err="1"/>
+              <a:t>i.i.d</a:t>
+            </a:r>
+            <a:r>
+              <a:rPr lang="en-US" dirty="0"/>
+              <a:t> fitted models in bagging methods mainly allows us to obtain an ensemble model with a </a:t>
+            </a:r>
+            <a:r>
+              <a:rPr lang="en-US" dirty="0">
+                <a:solidFill>
+                  <a:schemeClr val="accent2"/>
+                </a:solidFill>
+              </a:rPr>
+              <a:t>lower variance </a:t>
+            </a:r>
+            <a:r>
+              <a:rPr lang="en-US" dirty="0"/>
+              <a:t>than its components: that is why base models with low bias but high variance are well adapted for bagging</a:t>
+            </a:r>
+          </a:p>
+          <a:p>
+            <a:endParaRPr lang="en-US" dirty="0"/>
+          </a:p>
+        </p:txBody>
+      </p:sp>
+    </p:spTree>
+    <p:extLst>
+      <p:ext uri="{BB962C8B-B14F-4D97-AF65-F5344CB8AC3E}">
+        <p14:creationId xmlns:p14="http://schemas.microsoft.com/office/powerpoint/2010/main" val="2361233524"/>
+      </p:ext>
+    </p:extLst>
+  </p:cSld>
+  <p:clrMapOvr>
+    <a:masterClrMapping/>
+  </p:clrMapOvr>
+</p:sld>
+</file>
+
+<file path=ppt/slides/slide13.xml><?xml version="1.0" encoding="utf-8"?>
+<p:sld xmlns:a="http://schemas.openxmlformats.org/drawingml/2006/main" xmlns:r="http://schemas.openxmlformats.org/officeDocument/2006/relationships" xmlns:p="http://schemas.openxmlformats.org/presentationml/2006/main">
+  <p:cSld>
+    <p:spTree>
+      <p:nvGrpSpPr>
+        <p:cNvPr id="1" name=""/>
+        <p:cNvGrpSpPr/>
+        <p:nvPr/>
+      </p:nvGrpSpPr>
+      <p:grpSpPr>
+        <a:xfrm>
+          <a:off x="0" y="0"/>
+          <a:ext cx="0" cy="0"/>
+          <a:chOff x="0" y="0"/>
+          <a:chExt cx="0" cy="0"/>
+        </a:xfrm>
+      </p:grpSpPr>
+      <p:sp>
+        <p:nvSpPr>
+          <p:cNvPr id="2" name="Title 1">
+            <a:extLst>
+              <a:ext uri="{FF2B5EF4-FFF2-40B4-BE49-F238E27FC236}">
+                <a16:creationId xmlns:a16="http://schemas.microsoft.com/office/drawing/2014/main" id="{172D2B0F-081F-4ABF-8BDA-0218FF5FC428}"/>
+              </a:ext>
+            </a:extLst>
+          </p:cNvPr>
+          <p:cNvSpPr>
+            <a:spLocks noGrp="1"/>
+          </p:cNvSpPr>
+          <p:nvPr>
+            <p:ph type="title"/>
+          </p:nvPr>
+        </p:nvSpPr>
+        <p:spPr/>
+        <p:txBody>
+          <a:bodyPr/>
+          <a:lstStyle/>
+          <a:p>
+            <a:r>
+              <a:rPr lang="en-US" dirty="0"/>
+              <a:t>Takeaways</a:t>
+            </a:r>
+          </a:p>
+        </p:txBody>
+      </p:sp>
+      <p:sp>
+        <p:nvSpPr>
+          <p:cNvPr id="3" name="Content Placeholder 2">
+            <a:extLst>
+              <a:ext uri="{FF2B5EF4-FFF2-40B4-BE49-F238E27FC236}">
+                <a16:creationId xmlns:a16="http://schemas.microsoft.com/office/drawing/2014/main" id="{7DC80D4E-9338-408B-9BE1-FE6E64398997}"/>
+              </a:ext>
+            </a:extLst>
+          </p:cNvPr>
+          <p:cNvSpPr>
+            <a:spLocks noGrp="1"/>
+          </p:cNvSpPr>
+          <p:nvPr>
+            <p:ph idx="1"/>
+          </p:nvPr>
+        </p:nvSpPr>
+        <p:spPr/>
+        <p:txBody>
+          <a:bodyPr/>
+          <a:lstStyle/>
+          <a:p>
+            <a:pPr marL="225425" indent="-225425">
+              <a:buFont typeface="Courier New" panose="02070309020205020404" pitchFamily="49" charset="0"/>
+              <a:buChar char="o"/>
+            </a:pPr>
+            <a:r>
+              <a:rPr lang="en-US" dirty="0"/>
+              <a:t>In </a:t>
+            </a:r>
+            <a:r>
+              <a:rPr lang="en-US" dirty="0">
+                <a:solidFill>
+                  <a:srgbClr val="00B050"/>
+                </a:solidFill>
+              </a:rPr>
+              <a:t>boosting methods</a:t>
+            </a:r>
+            <a:r>
+              <a:rPr lang="en-US" dirty="0"/>
+              <a:t>, several instance of the same base model are trained sequentially such that, at each iteration, the way to train the current weak learner depends on the previous weak learners and more especially on how they are performing on the data</a:t>
+            </a:r>
+          </a:p>
+          <a:p>
+            <a:pPr marL="518033" lvl="1" indent="-225425">
+              <a:buFont typeface="Courier New" panose="02070309020205020404" pitchFamily="49" charset="0"/>
+              <a:buChar char="o"/>
+            </a:pPr>
+            <a:r>
+              <a:rPr lang="en-US" dirty="0"/>
+              <a:t>This iterative strategy of learning used in boosting methods, that adapts to the weaknesses of the previous models to train the current one, mainly allows us to get an ensemble model with a lower bias than its components: that is why weak learners with low variance but high bias are well adapted for boosting</a:t>
+            </a:r>
+          </a:p>
+          <a:p>
+            <a:pPr marL="225425" indent="-225425">
+              <a:buFont typeface="Courier New" panose="02070309020205020404" pitchFamily="49" charset="0"/>
+              <a:buChar char="o"/>
+            </a:pPr>
+            <a:r>
+              <a:rPr lang="en-US" dirty="0"/>
+              <a:t>In </a:t>
+            </a:r>
+            <a:r>
+              <a:rPr lang="en-US" dirty="0">
+                <a:solidFill>
+                  <a:srgbClr val="00B050"/>
+                </a:solidFill>
+              </a:rPr>
+              <a:t>stacking methods</a:t>
+            </a:r>
+            <a:r>
+              <a:rPr lang="en-US" dirty="0"/>
+              <a:t>, different weak learners are fitted independently from each others and a meta-model is trained on top of that to predict outputs based on the outputs returned by the base models</a:t>
+            </a:r>
+          </a:p>
+          <a:p>
+            <a:endParaRPr lang="en-US" dirty="0"/>
+          </a:p>
+        </p:txBody>
+      </p:sp>
+    </p:spTree>
+    <p:extLst>
+      <p:ext uri="{BB962C8B-B14F-4D97-AF65-F5344CB8AC3E}">
+        <p14:creationId xmlns:p14="http://schemas.microsoft.com/office/powerpoint/2010/main" val="2280035547"/>
+      </p:ext>
+    </p:extLst>
+  </p:cSld>
+  <p:clrMapOvr>
+    <a:masterClrMapping/>
+  </p:clrMapOvr>
+</p:sld>
+</file>
+
+<file path=ppt/slides/slide14.xml><?xml version="1.0" encoding="utf-8"?>
+<p:sld xmlns:a="http://schemas.openxmlformats.org/drawingml/2006/main" xmlns:r="http://schemas.openxmlformats.org/officeDocument/2006/relationships" xmlns:p="http://schemas.openxmlformats.org/presentationml/2006/main">
+  <p:cSld>
+    <p:spTree>
+      <p:nvGrpSpPr>
+        <p:cNvPr id="1" name=""/>
+        <p:cNvGrpSpPr/>
+        <p:nvPr/>
+      </p:nvGrpSpPr>
+      <p:grpSpPr>
+        <a:xfrm>
+          <a:off x="0" y="0"/>
+          <a:ext cx="0" cy="0"/>
+          <a:chOff x="0" y="0"/>
+          <a:chExt cx="0" cy="0"/>
+        </a:xfrm>
+      </p:grpSpPr>
+      <p:sp>
+        <p:nvSpPr>
+          <p:cNvPr id="2" name="Title 1">
+            <a:extLst>
+              <a:ext uri="{FF2B5EF4-FFF2-40B4-BE49-F238E27FC236}">
+                <a16:creationId xmlns:a16="http://schemas.microsoft.com/office/drawing/2014/main" id="{BFEFB98B-46A8-4E0F-AFD4-4D8B0963C0DC}"/>
+              </a:ext>
+            </a:extLst>
+          </p:cNvPr>
+          <p:cNvSpPr>
+            <a:spLocks noGrp="1"/>
+          </p:cNvSpPr>
+          <p:nvPr>
+            <p:ph type="title"/>
+          </p:nvPr>
+        </p:nvSpPr>
+        <p:spPr/>
+        <p:txBody>
+          <a:bodyPr/>
+          <a:lstStyle/>
+          <a:p>
+            <a:r>
+              <a:rPr lang="en-US" dirty="0"/>
+              <a:t>Appendix</a:t>
+            </a:r>
+          </a:p>
+        </p:txBody>
+      </p:sp>
+      <p:sp>
+        <p:nvSpPr>
+          <p:cNvPr id="3" name="Content Placeholder 2">
+            <a:extLst>
+              <a:ext uri="{FF2B5EF4-FFF2-40B4-BE49-F238E27FC236}">
+                <a16:creationId xmlns:a16="http://schemas.microsoft.com/office/drawing/2014/main" id="{97971212-2417-4017-91A2-2AA201B31E47}"/>
+              </a:ext>
+            </a:extLst>
+          </p:cNvPr>
+          <p:cNvSpPr>
+            <a:spLocks noGrp="1"/>
+          </p:cNvSpPr>
+          <p:nvPr>
+            <p:ph idx="1"/>
+          </p:nvPr>
+        </p:nvSpPr>
+        <p:spPr/>
+        <p:txBody>
+          <a:bodyPr/>
+          <a:lstStyle/>
+          <a:p>
+            <a:endParaRPr lang="en-US" dirty="0"/>
+          </a:p>
+        </p:txBody>
+      </p:sp>
+    </p:spTree>
+    <p:extLst>
+      <p:ext uri="{BB962C8B-B14F-4D97-AF65-F5344CB8AC3E}">
+        <p14:creationId xmlns:p14="http://schemas.microsoft.com/office/powerpoint/2010/main" val="1141172879"/>
+      </p:ext>
+    </p:extLst>
+  </p:cSld>
+  <p:clrMapOvr>
+    <a:masterClrMapping/>
+  </p:clrMapOvr>
+</p:sld>
+</file>
+
+<file path=ppt/slides/slide15.xml><?xml version="1.0" encoding="utf-8"?>
+<p:sld xmlns:a="http://schemas.openxmlformats.org/drawingml/2006/main" xmlns:r="http://schemas.openxmlformats.org/officeDocument/2006/relationships" xmlns:p="http://schemas.openxmlformats.org/presentationml/2006/main">
+  <p:cSld>
+    <p:spTree>
+      <p:nvGrpSpPr>
+        <p:cNvPr id="1" name=""/>
+        <p:cNvGrpSpPr/>
+        <p:nvPr/>
+      </p:nvGrpSpPr>
+      <p:grpSpPr>
+        <a:xfrm>
+          <a:off x="0" y="0"/>
+          <a:ext cx="0" cy="0"/>
+          <a:chOff x="0" y="0"/>
+          <a:chExt cx="0" cy="0"/>
+        </a:xfrm>
+      </p:grpSpPr>
+      <p:pic>
+        <p:nvPicPr>
+          <p:cNvPr id="2" name="Picture 1">
+            <a:extLst>
+              <a:ext uri="{FF2B5EF4-FFF2-40B4-BE49-F238E27FC236}">
+                <a16:creationId xmlns:a16="http://schemas.microsoft.com/office/drawing/2014/main" id="{56E62582-A60C-4BB3-8E1C-93DB80FB84E6}"/>
+              </a:ext>
+            </a:extLst>
+          </p:cNvPr>
+          <p:cNvPicPr>
+            <a:picLocks noChangeAspect="1"/>
+          </p:cNvPicPr>
+          <p:nvPr/>
+        </p:nvPicPr>
+        <p:blipFill>
+          <a:blip r:embed="rId2"/>
+          <a:stretch>
+            <a:fillRect/>
+          </a:stretch>
+        </p:blipFill>
+        <p:spPr>
+          <a:xfrm>
+            <a:off x="2945259" y="380144"/>
+            <a:ext cx="6655941" cy="4991956"/>
+          </a:xfrm>
+          <a:prstGeom prst="rect">
+            <a:avLst/>
+          </a:prstGeom>
+        </p:spPr>
+      </p:pic>
+    </p:spTree>
+    <p:extLst>
+      <p:ext uri="{BB962C8B-B14F-4D97-AF65-F5344CB8AC3E}">
+        <p14:creationId xmlns:p14="http://schemas.microsoft.com/office/powerpoint/2010/main" val="2274214785"/>
+      </p:ext>
+    </p:extLst>
+  </p:cSld>
+  <p:clrMapOvr>
+    <a:masterClrMapping/>
+  </p:clrMapOvr>
+</p:sld>
+</file>
+
 <file path=ppt/slides/slide2.xml><?xml version="1.0" encoding="utf-8"?>
 <p:sld xmlns:a="http://schemas.openxmlformats.org/drawingml/2006/main" xmlns:r="http://schemas.openxmlformats.org/officeDocument/2006/relationships" xmlns:p="http://schemas.openxmlformats.org/presentationml/2006/main">
   <p:cSld>
@@ -5524,7 +6797,114 @@
           <a:p>
             <a:r>
               <a:rPr lang="en-US" dirty="0"/>
-              <a:t>Example</a:t>
+              <a:t>Example - Darts</a:t>
+            </a:r>
+          </a:p>
+        </p:txBody>
+      </p:sp>
+      <p:sp>
+        <p:nvSpPr>
+          <p:cNvPr id="3" name="TextBox 2">
+            <a:extLst>
+              <a:ext uri="{FF2B5EF4-FFF2-40B4-BE49-F238E27FC236}">
+                <a16:creationId xmlns:a16="http://schemas.microsoft.com/office/drawing/2014/main" id="{42954C56-5378-4C34-A28C-B555DE5464E8}"/>
+              </a:ext>
+            </a:extLst>
+          </p:cNvPr>
+          <p:cNvSpPr txBox="1"/>
+          <p:nvPr/>
+        </p:nvSpPr>
+        <p:spPr>
+          <a:xfrm>
+            <a:off x="1037689" y="5648218"/>
+            <a:ext cx="8123314" cy="369332"/>
+          </a:xfrm>
+          <a:prstGeom prst="rect">
+            <a:avLst/>
+          </a:prstGeom>
+          <a:noFill/>
+        </p:spPr>
+        <p:txBody>
+          <a:bodyPr wrap="none" rtlCol="0">
+            <a:spAutoFit/>
+          </a:bodyPr>
+          <a:lstStyle/>
+          <a:p>
+            <a:r>
+              <a:rPr lang="en-US" dirty="0">
+                <a:hlinkClick r:id="rId2"/>
+              </a:rPr>
+              <a:t>https://www.gormanalysis.com/blog/guide-to-model-stacking-i-e-meta-ensembling/</a:t>
+            </a:r>
+            <a:endParaRPr lang="en-US" dirty="0"/>
+          </a:p>
+        </p:txBody>
+      </p:sp>
+      <p:pic>
+        <p:nvPicPr>
+          <p:cNvPr id="4" name="Picture 3">
+            <a:extLst>
+              <a:ext uri="{FF2B5EF4-FFF2-40B4-BE49-F238E27FC236}">
+                <a16:creationId xmlns:a16="http://schemas.microsoft.com/office/drawing/2014/main" id="{6D315CFD-24F9-48AD-A51F-3D99FC0B39A3}"/>
+              </a:ext>
+            </a:extLst>
+          </p:cNvPr>
+          <p:cNvPicPr>
+            <a:picLocks noChangeAspect="1"/>
+          </p:cNvPicPr>
+          <p:nvPr/>
+        </p:nvPicPr>
+        <p:blipFill>
+          <a:blip r:embed="rId3"/>
+          <a:stretch>
+            <a:fillRect/>
+          </a:stretch>
+        </p:blipFill>
+        <p:spPr>
+          <a:xfrm>
+            <a:off x="963203" y="2133600"/>
+            <a:ext cx="7162800" cy="2590800"/>
+          </a:xfrm>
+          <a:prstGeom prst="rect">
+            <a:avLst/>
+          </a:prstGeom>
+        </p:spPr>
+      </p:pic>
+      <p:sp>
+        <p:nvSpPr>
+          <p:cNvPr id="5" name="TextBox 4">
+            <a:extLst>
+              <a:ext uri="{FF2B5EF4-FFF2-40B4-BE49-F238E27FC236}">
+                <a16:creationId xmlns:a16="http://schemas.microsoft.com/office/drawing/2014/main" id="{E1DC9ECA-A561-48A0-A271-9F29106F0AB2}"/>
+              </a:ext>
+            </a:extLst>
+          </p:cNvPr>
+          <p:cNvSpPr txBox="1"/>
+          <p:nvPr/>
+        </p:nvSpPr>
+        <p:spPr>
+          <a:xfrm>
+            <a:off x="8260423" y="2967335"/>
+            <a:ext cx="2794570" cy="923330"/>
+          </a:xfrm>
+          <a:prstGeom prst="rect">
+            <a:avLst/>
+          </a:prstGeom>
+          <a:noFill/>
+        </p:spPr>
+        <p:txBody>
+          <a:bodyPr wrap="square" rtlCol="0">
+            <a:spAutoFit/>
+          </a:bodyPr>
+          <a:lstStyle/>
+          <a:p>
+            <a:r>
+              <a:rPr lang="en-US" dirty="0">
+                <a:solidFill>
+                  <a:srgbClr val="0070C0"/>
+                </a:solidFill>
+              </a:rPr>
+              <a:t>187 darts are thrown by 4 competitors (150 are labeled)</a:t>
             </a:r>
           </a:p>
         </p:txBody>
@@ -5564,7 +6944,7 @@
           <p:cNvPr id="2" name="Title 1">
             <a:extLst>
               <a:ext uri="{FF2B5EF4-FFF2-40B4-BE49-F238E27FC236}">
-                <a16:creationId xmlns:a16="http://schemas.microsoft.com/office/drawing/2014/main" id="{3FFAD1F2-6553-4FB1-9A7F-A0C60E667FAF}"/>
+                <a16:creationId xmlns:a16="http://schemas.microsoft.com/office/drawing/2014/main" id="{070A55DE-AED3-446B-9C12-CF32F618D003}"/>
               </a:ext>
             </a:extLst>
           </p:cNvPr>
@@ -5582,7 +6962,7 @@
           <a:p>
             <a:r>
               <a:rPr lang="en-US" dirty="0"/>
-              <a:t>Takeaways</a:t>
+              <a:t>Example - Darts</a:t>
             </a:r>
           </a:p>
         </p:txBody>
@@ -5592,7 +6972,7 @@
           <p:cNvPr id="3" name="Content Placeholder 2">
             <a:extLst>
               <a:ext uri="{FF2B5EF4-FFF2-40B4-BE49-F238E27FC236}">
-                <a16:creationId xmlns:a16="http://schemas.microsoft.com/office/drawing/2014/main" id="{08222B6B-4412-427A-B273-5C275872E363}"/>
+                <a16:creationId xmlns:a16="http://schemas.microsoft.com/office/drawing/2014/main" id="{50F3164D-E51E-4CB2-85EB-FEBFCA3D631A}"/>
               </a:ext>
             </a:extLst>
           </p:cNvPr>
@@ -5605,9 +6985,7 @@
         </p:nvSpPr>
         <p:spPr/>
         <p:txBody>
-          <a:bodyPr>
-            <a:normAutofit/>
-          </a:bodyPr>
+          <a:bodyPr/>
           <a:lstStyle/>
           <a:p>
             <a:pPr marL="225425" indent="-225425">
@@ -5616,7 +6994,7 @@
             </a:pPr>
             <a:r>
               <a:rPr lang="en-US" dirty="0"/>
-              <a:t>Ensemble learning is a machine learning paradigm where multiple models (often called weak learners or base models) are trained to solve the same problem and combined to get better performances</a:t>
+              <a:t>On training set, establish folds (n = 5)</a:t>
             </a:r>
           </a:p>
           <a:p>
@@ -5626,90 +7004,117 @@
             </a:pPr>
             <a:r>
               <a:rPr lang="en-US" dirty="0"/>
-              <a:t>The main hypothesis is that if </a:t>
-            </a:r>
-            <a:r>
-              <a:rPr lang="en-US" dirty="0">
-                <a:solidFill>
-                  <a:srgbClr val="00B0F0"/>
-                </a:solidFill>
-              </a:rPr>
-              <a:t>we combine the weak learners the right way </a:t>
-            </a:r>
-            <a:r>
-              <a:rPr lang="en-US" dirty="0"/>
-              <a:t>we can obtain more accurate and/or robust models</a:t>
-            </a:r>
-          </a:p>
-          <a:p>
-            <a:pPr marL="225425" indent="-225425">
+              <a:t>For each fold:</a:t>
+            </a:r>
+          </a:p>
+          <a:p>
+            <a:pPr marL="518033" lvl="1" indent="-225425">
               <a:buFont typeface="Courier New" panose="02070309020205020404" pitchFamily="49" charset="0"/>
               <a:buChar char="o"/>
             </a:pPr>
             <a:r>
               <a:rPr lang="en-US" dirty="0"/>
-              <a:t>In </a:t>
-            </a:r>
-            <a:r>
-              <a:rPr lang="en-US" dirty="0">
-                <a:solidFill>
-                  <a:srgbClr val="00B050"/>
-                </a:solidFill>
-              </a:rPr>
-              <a:t>bagging methods</a:t>
-            </a:r>
-            <a:r>
-              <a:rPr lang="en-US" dirty="0"/>
-              <a:t>, several instance of the </a:t>
-            </a:r>
-            <a:r>
-              <a:rPr lang="en-US" b="1" dirty="0"/>
-              <a:t>same base model </a:t>
-            </a:r>
-            <a:r>
-              <a:rPr lang="en-US" dirty="0"/>
-              <a:t>are trained in parallel (independently from each others) on different bootstrap samples and then aggregated in some kind of “averaging” process</a:t>
-            </a:r>
-          </a:p>
-          <a:p>
-            <a:pPr marL="225425" indent="-225425">
+              <a:t>combine remaining folds as training set</a:t>
+            </a:r>
+          </a:p>
+          <a:p>
+            <a:pPr marL="518033" lvl="1" indent="-225425">
               <a:buFont typeface="Courier New" panose="02070309020205020404" pitchFamily="49" charset="0"/>
               <a:buChar char="o"/>
             </a:pPr>
             <a:r>
               <a:rPr lang="en-US" dirty="0"/>
-              <a:t>The kind of averaging operation done over the (almost) </a:t>
-            </a:r>
-            <a:r>
-              <a:rPr lang="en-US" dirty="0" err="1"/>
-              <a:t>i.i.d</a:t>
-            </a:r>
+              <a:t>Fit model on training set</a:t>
+            </a:r>
+          </a:p>
+          <a:p>
+            <a:pPr marL="518033" lvl="1" indent="-225425">
+              <a:buFont typeface="Courier New" panose="02070309020205020404" pitchFamily="49" charset="0"/>
+              <a:buChar char="o"/>
+            </a:pPr>
             <a:r>
               <a:rPr lang="en-US" dirty="0"/>
-              <a:t> fitted models in bagging methods mainly allows us to obtain an ensemble model with a </a:t>
-            </a:r>
-            <a:r>
-              <a:rPr lang="en-US" dirty="0">
-                <a:solidFill>
-                  <a:schemeClr val="accent2"/>
-                </a:solidFill>
-              </a:rPr>
-              <a:t>lower variance </a:t>
-            </a:r>
-            <a:r>
-              <a:rPr lang="en-US" dirty="0"/>
-              <a:t>than its components: that is why base models with low bias but high variance are well adapted for bagging</a:t>
-            </a:r>
-          </a:p>
-          <a:p>
+              <a:t>Add these outputs to training set</a:t>
+            </a:r>
+          </a:p>
+          <a:p>
+            <a:pPr marL="0" indent="0">
+              <a:buNone/>
+            </a:pPr>
             <a:endParaRPr lang="en-US" dirty="0"/>
           </a:p>
-        </p:txBody>
-      </p:sp>
+          <a:p>
+            <a:pPr marL="0" indent="0">
+              <a:buNone/>
+            </a:pPr>
+            <a:endParaRPr lang="en-US" dirty="0"/>
+          </a:p>
+        </p:txBody>
+      </p:sp>
+      <p:pic>
+        <p:nvPicPr>
+          <p:cNvPr id="4" name="Picture 3">
+            <a:extLst>
+              <a:ext uri="{FF2B5EF4-FFF2-40B4-BE49-F238E27FC236}">
+                <a16:creationId xmlns:a16="http://schemas.microsoft.com/office/drawing/2014/main" id="{3DF1D641-D10F-4A5B-BD29-C04052AC8619}"/>
+              </a:ext>
+            </a:extLst>
+          </p:cNvPr>
+          <p:cNvPicPr>
+            <a:picLocks noChangeAspect="1"/>
+          </p:cNvPicPr>
+          <p:nvPr/>
+        </p:nvPicPr>
+        <p:blipFill>
+          <a:blip r:embed="rId2"/>
+          <a:stretch>
+            <a:fillRect/>
+          </a:stretch>
+        </p:blipFill>
+        <p:spPr>
+          <a:xfrm>
+            <a:off x="1199876" y="3857414"/>
+            <a:ext cx="3542646" cy="2030105"/>
+          </a:xfrm>
+          <a:prstGeom prst="rect">
+            <a:avLst/>
+          </a:prstGeom>
+        </p:spPr>
+      </p:pic>
+      <p:pic>
+        <p:nvPicPr>
+          <p:cNvPr id="5" name="Picture 4">
+            <a:extLst>
+              <a:ext uri="{FF2B5EF4-FFF2-40B4-BE49-F238E27FC236}">
+                <a16:creationId xmlns:a16="http://schemas.microsoft.com/office/drawing/2014/main" id="{7C608EC2-939B-4FBF-A003-CD9920E00420}"/>
+              </a:ext>
+            </a:extLst>
+          </p:cNvPr>
+          <p:cNvPicPr>
+            <a:picLocks noChangeAspect="1"/>
+          </p:cNvPicPr>
+          <p:nvPr/>
+        </p:nvPicPr>
+        <p:blipFill>
+          <a:blip r:embed="rId3"/>
+          <a:stretch>
+            <a:fillRect/>
+          </a:stretch>
+        </p:blipFill>
+        <p:spPr>
+          <a:xfrm>
+            <a:off x="6255876" y="3917675"/>
+            <a:ext cx="3386449" cy="1909581"/>
+          </a:xfrm>
+          <a:prstGeom prst="rect">
+            <a:avLst/>
+          </a:prstGeom>
+        </p:spPr>
+      </p:pic>
     </p:spTree>
     <p:extLst>
       <p:ext uri="{BB962C8B-B14F-4D97-AF65-F5344CB8AC3E}">
-        <p14:creationId xmlns:p14="http://schemas.microsoft.com/office/powerpoint/2010/main" val="2361233524"/>
+        <p14:creationId xmlns:p14="http://schemas.microsoft.com/office/powerpoint/2010/main" val="1082523995"/>
       </p:ext>
     </p:extLst>
   </p:cSld>
@@ -5738,115 +7143,1170 @@
       </p:grpSpPr>
       <p:sp>
         <p:nvSpPr>
-          <p:cNvPr id="2" name="Title 1">
+          <p:cNvPr id="3" name="TextBox 2">
             <a:extLst>
               <a:ext uri="{FF2B5EF4-FFF2-40B4-BE49-F238E27FC236}">
-                <a16:creationId xmlns:a16="http://schemas.microsoft.com/office/drawing/2014/main" id="{172D2B0F-081F-4ABF-8BDA-0218FF5FC428}"/>
+                <a16:creationId xmlns:a16="http://schemas.microsoft.com/office/drawing/2014/main" id="{559C6BE0-33E4-4D13-BE39-C8F00D66E311}"/>
               </a:ext>
             </a:extLst>
           </p:cNvPr>
-          <p:cNvSpPr>
-            <a:spLocks noGrp="1"/>
-          </p:cNvSpPr>
-          <p:nvPr>
-            <p:ph type="title"/>
-          </p:nvPr>
-        </p:nvSpPr>
-        <p:spPr/>
-        <p:txBody>
-          <a:bodyPr/>
+          <p:cNvSpPr txBox="1"/>
+          <p:nvPr/>
+        </p:nvSpPr>
+        <p:spPr>
+          <a:xfrm>
+            <a:off x="693719" y="554804"/>
+            <a:ext cx="10804561" cy="5509200"/>
+          </a:xfrm>
+          <a:prstGeom prst="rect">
+            <a:avLst/>
+          </a:prstGeom>
+          <a:noFill/>
+        </p:spPr>
+        <p:txBody>
+          <a:bodyPr wrap="none" rtlCol="0">
+            <a:spAutoFit/>
+          </a:bodyPr>
           <a:lstStyle/>
           <a:p>
             <a:r>
-              <a:rPr lang="en-US" dirty="0"/>
-              <a:t>Takeaways</a:t>
-            </a:r>
-          </a:p>
-        </p:txBody>
-      </p:sp>
-      <p:sp>
-        <p:nvSpPr>
-          <p:cNvPr id="3" name="Content Placeholder 2">
+              <a:rPr lang="en-US" sz="1100" dirty="0">
+                <a:latin typeface="Courier New" panose="02070309020205020404" pitchFamily="49" charset="0"/>
+                <a:cs typeface="Courier New" panose="02070309020205020404" pitchFamily="49" charset="0"/>
+              </a:rPr>
+              <a:t># SVM Grid search</a:t>
+            </a:r>
+          </a:p>
+          <a:p>
+            <a:r>
+              <a:rPr lang="en-US" sz="1100" dirty="0">
+                <a:latin typeface="Courier New" panose="02070309020205020404" pitchFamily="49" charset="0"/>
+                <a:cs typeface="Courier New" panose="02070309020205020404" pitchFamily="49" charset="0"/>
+              </a:rPr>
+              <a:t>library(caret)</a:t>
+            </a:r>
+          </a:p>
+          <a:p>
+            <a:r>
+              <a:rPr lang="en-US" sz="1100" dirty="0" err="1">
+                <a:latin typeface="Courier New" panose="02070309020205020404" pitchFamily="49" charset="0"/>
+                <a:cs typeface="Courier New" panose="02070309020205020404" pitchFamily="49" charset="0"/>
+              </a:rPr>
+              <a:t>set.seed</a:t>
+            </a:r>
+            <a:r>
+              <a:rPr lang="en-US" sz="1100" dirty="0">
+                <a:latin typeface="Courier New" panose="02070309020205020404" pitchFamily="49" charset="0"/>
+                <a:cs typeface="Courier New" panose="02070309020205020404" pitchFamily="49" charset="0"/>
+              </a:rPr>
+              <a:t>(101)</a:t>
+            </a:r>
+          </a:p>
+          <a:p>
+            <a:r>
+              <a:rPr lang="en-US" sz="1100" dirty="0" err="1">
+                <a:latin typeface="Courier New" panose="02070309020205020404" pitchFamily="49" charset="0"/>
+                <a:cs typeface="Courier New" panose="02070309020205020404" pitchFamily="49" charset="0"/>
+              </a:rPr>
+              <a:t>svm_grid</a:t>
+            </a:r>
+            <a:r>
+              <a:rPr lang="en-US" sz="1100" dirty="0">
+                <a:latin typeface="Courier New" panose="02070309020205020404" pitchFamily="49" charset="0"/>
+                <a:cs typeface="Courier New" panose="02070309020205020404" pitchFamily="49" charset="0"/>
+              </a:rPr>
+              <a:t> &lt;- </a:t>
+            </a:r>
+            <a:r>
+              <a:rPr lang="en-US" sz="1100" dirty="0" err="1">
+                <a:latin typeface="Courier New" panose="02070309020205020404" pitchFamily="49" charset="0"/>
+                <a:cs typeface="Courier New" panose="02070309020205020404" pitchFamily="49" charset="0"/>
+              </a:rPr>
+              <a:t>expand.grid</a:t>
+            </a:r>
+            <a:r>
+              <a:rPr lang="en-US" sz="1100" dirty="0">
+                <a:latin typeface="Courier New" panose="02070309020205020404" pitchFamily="49" charset="0"/>
+                <a:cs typeface="Courier New" panose="02070309020205020404" pitchFamily="49" charset="0"/>
+              </a:rPr>
+              <a:t>(gamma = c(1e-6,1e-5,1e-4, 1e-3, 1e-2), cost = c(1,1e+2,1e+3,1e+4,1e+5), epsilon = c(0.1, 0.01,0.001))</a:t>
+            </a:r>
+          </a:p>
+          <a:p>
+            <a:r>
+              <a:rPr lang="en-US" sz="1100" dirty="0">
+                <a:latin typeface="Courier New" panose="02070309020205020404" pitchFamily="49" charset="0"/>
+                <a:cs typeface="Courier New" panose="02070309020205020404" pitchFamily="49" charset="0"/>
+              </a:rPr>
+              <a:t>folds &lt;- </a:t>
+            </a:r>
+            <a:r>
+              <a:rPr lang="en-US" sz="1100" dirty="0" err="1">
+                <a:latin typeface="Courier New" panose="02070309020205020404" pitchFamily="49" charset="0"/>
+                <a:cs typeface="Courier New" panose="02070309020205020404" pitchFamily="49" charset="0"/>
+              </a:rPr>
+              <a:t>createFolds</a:t>
+            </a:r>
+            <a:r>
+              <a:rPr lang="en-US" sz="1100" dirty="0">
+                <a:latin typeface="Courier New" panose="02070309020205020404" pitchFamily="49" charset="0"/>
+                <a:cs typeface="Courier New" panose="02070309020205020404" pitchFamily="49" charset="0"/>
+              </a:rPr>
+              <a:t>(outcomes, k = 5)</a:t>
+            </a:r>
+          </a:p>
+          <a:p>
+            <a:endParaRPr lang="en-US" sz="1100" dirty="0">
+              <a:latin typeface="Courier New" panose="02070309020205020404" pitchFamily="49" charset="0"/>
+              <a:cs typeface="Courier New" panose="02070309020205020404" pitchFamily="49" charset="0"/>
+            </a:endParaRPr>
+          </a:p>
+          <a:p>
+            <a:r>
+              <a:rPr lang="en-US" sz="1100" dirty="0">
+                <a:latin typeface="Courier New" panose="02070309020205020404" pitchFamily="49" charset="0"/>
+                <a:cs typeface="Courier New" panose="02070309020205020404" pitchFamily="49" charset="0"/>
+              </a:rPr>
+              <a:t># Function for CV</a:t>
+            </a:r>
+          </a:p>
+          <a:p>
+            <a:r>
+              <a:rPr lang="en-US" sz="1100" dirty="0">
+                <a:latin typeface="Courier New" panose="02070309020205020404" pitchFamily="49" charset="0"/>
+                <a:cs typeface="Courier New" panose="02070309020205020404" pitchFamily="49" charset="0"/>
+              </a:rPr>
+              <a:t>svm.cv &lt;- function(gamma, cost, epsilon){</a:t>
+            </a:r>
+          </a:p>
+          <a:p>
+            <a:r>
+              <a:rPr lang="en-US" sz="1100" dirty="0">
+                <a:latin typeface="Courier New" panose="02070309020205020404" pitchFamily="49" charset="0"/>
+                <a:cs typeface="Courier New" panose="02070309020205020404" pitchFamily="49" charset="0"/>
+              </a:rPr>
+              <a:t>  </a:t>
+            </a:r>
+            <a:r>
+              <a:rPr lang="en-US" sz="1100" dirty="0" err="1">
+                <a:latin typeface="Courier New" panose="02070309020205020404" pitchFamily="49" charset="0"/>
+                <a:cs typeface="Courier New" panose="02070309020205020404" pitchFamily="49" charset="0"/>
+              </a:rPr>
+              <a:t>rmse</a:t>
+            </a:r>
+            <a:r>
+              <a:rPr lang="en-US" sz="1100" dirty="0">
+                <a:latin typeface="Courier New" panose="02070309020205020404" pitchFamily="49" charset="0"/>
+                <a:cs typeface="Courier New" panose="02070309020205020404" pitchFamily="49" charset="0"/>
+              </a:rPr>
+              <a:t> &lt;- c() # Initiate</a:t>
+            </a:r>
+          </a:p>
+          <a:p>
+            <a:r>
+              <a:rPr lang="en-US" sz="1100" dirty="0">
+                <a:latin typeface="Courier New" panose="02070309020205020404" pitchFamily="49" charset="0"/>
+                <a:cs typeface="Courier New" panose="02070309020205020404" pitchFamily="49" charset="0"/>
+              </a:rPr>
+              <a:t>  </a:t>
+            </a:r>
+          </a:p>
+          <a:p>
+            <a:r>
+              <a:rPr lang="en-US" sz="1100" dirty="0">
+                <a:latin typeface="Courier New" panose="02070309020205020404" pitchFamily="49" charset="0"/>
+                <a:cs typeface="Courier New" panose="02070309020205020404" pitchFamily="49" charset="0"/>
+              </a:rPr>
+              <a:t>  for (</a:t>
+            </a:r>
+            <a:r>
+              <a:rPr lang="en-US" sz="1100" dirty="0" err="1">
+                <a:latin typeface="Courier New" panose="02070309020205020404" pitchFamily="49" charset="0"/>
+                <a:cs typeface="Courier New" panose="02070309020205020404" pitchFamily="49" charset="0"/>
+              </a:rPr>
+              <a:t>ifold</a:t>
+            </a:r>
+            <a:r>
+              <a:rPr lang="en-US" sz="1100" dirty="0">
+                <a:latin typeface="Courier New" panose="02070309020205020404" pitchFamily="49" charset="0"/>
+                <a:cs typeface="Courier New" panose="02070309020205020404" pitchFamily="49" charset="0"/>
+              </a:rPr>
+              <a:t> in 1:length(folds)){</a:t>
+            </a:r>
+          </a:p>
+          <a:p>
+            <a:r>
+              <a:rPr lang="en-US" sz="1100" dirty="0">
+                <a:latin typeface="Courier New" panose="02070309020205020404" pitchFamily="49" charset="0"/>
+                <a:cs typeface="Courier New" panose="02070309020205020404" pitchFamily="49" charset="0"/>
+              </a:rPr>
+              <a:t>    </a:t>
+            </a:r>
+            <a:r>
+              <a:rPr lang="en-US" sz="1100" dirty="0" err="1">
+                <a:latin typeface="Courier New" panose="02070309020205020404" pitchFamily="49" charset="0"/>
+                <a:cs typeface="Courier New" panose="02070309020205020404" pitchFamily="49" charset="0"/>
+              </a:rPr>
+              <a:t>itr</a:t>
+            </a:r>
+            <a:r>
+              <a:rPr lang="en-US" sz="1100" dirty="0">
+                <a:latin typeface="Courier New" panose="02070309020205020404" pitchFamily="49" charset="0"/>
+                <a:cs typeface="Courier New" panose="02070309020205020404" pitchFamily="49" charset="0"/>
+              </a:rPr>
+              <a:t> &lt;- </a:t>
+            </a:r>
+            <a:r>
+              <a:rPr lang="en-US" sz="1100" dirty="0" err="1">
+                <a:latin typeface="Courier New" panose="02070309020205020404" pitchFamily="49" charset="0"/>
+                <a:cs typeface="Courier New" panose="02070309020205020404" pitchFamily="49" charset="0"/>
+              </a:rPr>
+              <a:t>unlist</a:t>
+            </a:r>
+            <a:r>
+              <a:rPr lang="en-US" sz="1100" dirty="0">
+                <a:latin typeface="Courier New" panose="02070309020205020404" pitchFamily="49" charset="0"/>
+                <a:cs typeface="Courier New" panose="02070309020205020404" pitchFamily="49" charset="0"/>
+              </a:rPr>
+              <a:t>(folds[-</a:t>
+            </a:r>
+            <a:r>
+              <a:rPr lang="en-US" sz="1100" dirty="0" err="1">
+                <a:latin typeface="Courier New" panose="02070309020205020404" pitchFamily="49" charset="0"/>
+                <a:cs typeface="Courier New" panose="02070309020205020404" pitchFamily="49" charset="0"/>
+              </a:rPr>
+              <a:t>ifold</a:t>
+            </a:r>
+            <a:r>
+              <a:rPr lang="en-US" sz="1100" dirty="0">
+                <a:latin typeface="Courier New" panose="02070309020205020404" pitchFamily="49" charset="0"/>
+                <a:cs typeface="Courier New" panose="02070309020205020404" pitchFamily="49" charset="0"/>
+              </a:rPr>
+              <a:t>])</a:t>
+            </a:r>
+          </a:p>
+          <a:p>
+            <a:r>
+              <a:rPr lang="en-US" sz="1100" dirty="0">
+                <a:latin typeface="Courier New" panose="02070309020205020404" pitchFamily="49" charset="0"/>
+                <a:cs typeface="Courier New" panose="02070309020205020404" pitchFamily="49" charset="0"/>
+              </a:rPr>
+              <a:t>    </a:t>
+            </a:r>
+            <a:r>
+              <a:rPr lang="en-US" sz="1100" dirty="0" err="1">
+                <a:latin typeface="Courier New" panose="02070309020205020404" pitchFamily="49" charset="0"/>
+                <a:cs typeface="Courier New" panose="02070309020205020404" pitchFamily="49" charset="0"/>
+              </a:rPr>
+              <a:t>Xtrain</a:t>
+            </a:r>
+            <a:r>
+              <a:rPr lang="en-US" sz="1100" dirty="0">
+                <a:latin typeface="Courier New" panose="02070309020205020404" pitchFamily="49" charset="0"/>
+                <a:cs typeface="Courier New" panose="02070309020205020404" pitchFamily="49" charset="0"/>
+              </a:rPr>
+              <a:t> &lt;- </a:t>
+            </a:r>
+            <a:r>
+              <a:rPr lang="en-US" sz="1100" dirty="0" err="1">
+                <a:latin typeface="Courier New" panose="02070309020205020404" pitchFamily="49" charset="0"/>
+                <a:cs typeface="Courier New" panose="02070309020205020404" pitchFamily="49" charset="0"/>
+              </a:rPr>
+              <a:t>as.matrix</a:t>
+            </a:r>
+            <a:r>
+              <a:rPr lang="en-US" sz="1100" dirty="0">
+                <a:latin typeface="Courier New" panose="02070309020205020404" pitchFamily="49" charset="0"/>
+                <a:cs typeface="Courier New" panose="02070309020205020404" pitchFamily="49" charset="0"/>
+              </a:rPr>
+              <a:t>(</a:t>
+            </a:r>
+            <a:r>
+              <a:rPr lang="en-US" sz="1100" dirty="0" err="1">
+                <a:latin typeface="Courier New" panose="02070309020205020404" pitchFamily="49" charset="0"/>
+                <a:cs typeface="Courier New" panose="02070309020205020404" pitchFamily="49" charset="0"/>
+              </a:rPr>
+              <a:t>trainSparse</a:t>
+            </a:r>
+            <a:r>
+              <a:rPr lang="en-US" sz="1100" dirty="0">
+                <a:latin typeface="Courier New" panose="02070309020205020404" pitchFamily="49" charset="0"/>
+                <a:cs typeface="Courier New" panose="02070309020205020404" pitchFamily="49" charset="0"/>
+              </a:rPr>
+              <a:t>)[</a:t>
+            </a:r>
+            <a:r>
+              <a:rPr lang="en-US" sz="1100" dirty="0" err="1">
+                <a:latin typeface="Courier New" panose="02070309020205020404" pitchFamily="49" charset="0"/>
+                <a:cs typeface="Courier New" panose="02070309020205020404" pitchFamily="49" charset="0"/>
+              </a:rPr>
+              <a:t>itr</a:t>
+            </a:r>
+            <a:r>
+              <a:rPr lang="en-US" sz="1100" dirty="0">
+                <a:latin typeface="Courier New" panose="02070309020205020404" pitchFamily="49" charset="0"/>
+                <a:cs typeface="Courier New" panose="02070309020205020404" pitchFamily="49" charset="0"/>
+              </a:rPr>
+              <a:t>,]</a:t>
+            </a:r>
+          </a:p>
+          <a:p>
+            <a:r>
+              <a:rPr lang="en-US" sz="1100" dirty="0">
+                <a:latin typeface="Courier New" panose="02070309020205020404" pitchFamily="49" charset="0"/>
+                <a:cs typeface="Courier New" panose="02070309020205020404" pitchFamily="49" charset="0"/>
+              </a:rPr>
+              <a:t>    </a:t>
+            </a:r>
+            <a:r>
+              <a:rPr lang="en-US" sz="1100" dirty="0" err="1">
+                <a:latin typeface="Courier New" panose="02070309020205020404" pitchFamily="49" charset="0"/>
+                <a:cs typeface="Courier New" panose="02070309020205020404" pitchFamily="49" charset="0"/>
+              </a:rPr>
+              <a:t>Xvalid</a:t>
+            </a:r>
+            <a:r>
+              <a:rPr lang="en-US" sz="1100" dirty="0">
+                <a:latin typeface="Courier New" panose="02070309020205020404" pitchFamily="49" charset="0"/>
+                <a:cs typeface="Courier New" panose="02070309020205020404" pitchFamily="49" charset="0"/>
+              </a:rPr>
+              <a:t> &lt;- </a:t>
+            </a:r>
+            <a:r>
+              <a:rPr lang="en-US" sz="1100" dirty="0" err="1">
+                <a:latin typeface="Courier New" panose="02070309020205020404" pitchFamily="49" charset="0"/>
+                <a:cs typeface="Courier New" panose="02070309020205020404" pitchFamily="49" charset="0"/>
+              </a:rPr>
+              <a:t>as.matrix</a:t>
+            </a:r>
+            <a:r>
+              <a:rPr lang="en-US" sz="1100" dirty="0">
+                <a:latin typeface="Courier New" panose="02070309020205020404" pitchFamily="49" charset="0"/>
+                <a:cs typeface="Courier New" panose="02070309020205020404" pitchFamily="49" charset="0"/>
+              </a:rPr>
+              <a:t>(</a:t>
+            </a:r>
+            <a:r>
+              <a:rPr lang="en-US" sz="1100" dirty="0" err="1">
+                <a:latin typeface="Courier New" panose="02070309020205020404" pitchFamily="49" charset="0"/>
+                <a:cs typeface="Courier New" panose="02070309020205020404" pitchFamily="49" charset="0"/>
+              </a:rPr>
+              <a:t>trainSparse</a:t>
+            </a:r>
+            <a:r>
+              <a:rPr lang="en-US" sz="1100" dirty="0">
+                <a:latin typeface="Courier New" panose="02070309020205020404" pitchFamily="49" charset="0"/>
+                <a:cs typeface="Courier New" panose="02070309020205020404" pitchFamily="49" charset="0"/>
+              </a:rPr>
+              <a:t>)[-</a:t>
+            </a:r>
+            <a:r>
+              <a:rPr lang="en-US" sz="1100" dirty="0" err="1">
+                <a:latin typeface="Courier New" panose="02070309020205020404" pitchFamily="49" charset="0"/>
+                <a:cs typeface="Courier New" panose="02070309020205020404" pitchFamily="49" charset="0"/>
+              </a:rPr>
+              <a:t>itr</a:t>
+            </a:r>
+            <a:r>
+              <a:rPr lang="en-US" sz="1100" dirty="0">
+                <a:latin typeface="Courier New" panose="02070309020205020404" pitchFamily="49" charset="0"/>
+                <a:cs typeface="Courier New" panose="02070309020205020404" pitchFamily="49" charset="0"/>
+              </a:rPr>
+              <a:t>,]</a:t>
+            </a:r>
+          </a:p>
+          <a:p>
+            <a:r>
+              <a:rPr lang="en-US" sz="1100" dirty="0">
+                <a:latin typeface="Courier New" panose="02070309020205020404" pitchFamily="49" charset="0"/>
+                <a:cs typeface="Courier New" panose="02070309020205020404" pitchFamily="49" charset="0"/>
+              </a:rPr>
+              <a:t>    # Fit SVR</a:t>
+            </a:r>
+          </a:p>
+          <a:p>
+            <a:r>
+              <a:rPr lang="en-US" sz="1100" dirty="0">
+                <a:latin typeface="Courier New" panose="02070309020205020404" pitchFamily="49" charset="0"/>
+                <a:cs typeface="Courier New" panose="02070309020205020404" pitchFamily="49" charset="0"/>
+              </a:rPr>
+              <a:t>    #</a:t>
+            </a:r>
+            <a:r>
+              <a:rPr lang="en-US" sz="1100" dirty="0" err="1">
+                <a:latin typeface="Courier New" panose="02070309020205020404" pitchFamily="49" charset="0"/>
+                <a:cs typeface="Courier New" panose="02070309020205020404" pitchFamily="49" charset="0"/>
+              </a:rPr>
+              <a:t>lscaleCols</a:t>
+            </a:r>
+            <a:r>
+              <a:rPr lang="en-US" sz="1100" dirty="0">
+                <a:latin typeface="Courier New" panose="02070309020205020404" pitchFamily="49" charset="0"/>
+                <a:cs typeface="Courier New" panose="02070309020205020404" pitchFamily="49" charset="0"/>
+              </a:rPr>
+              <a:t> &lt;- </a:t>
+            </a:r>
+            <a:r>
+              <a:rPr lang="en-US" sz="1100" dirty="0" err="1">
+                <a:latin typeface="Courier New" panose="02070309020205020404" pitchFamily="49" charset="0"/>
+                <a:cs typeface="Courier New" panose="02070309020205020404" pitchFamily="49" charset="0"/>
+              </a:rPr>
+              <a:t>trainSparse@Dimnames</a:t>
+            </a:r>
+            <a:r>
+              <a:rPr lang="en-US" sz="1100" dirty="0">
+                <a:latin typeface="Courier New" panose="02070309020205020404" pitchFamily="49" charset="0"/>
+                <a:cs typeface="Courier New" panose="02070309020205020404" pitchFamily="49" charset="0"/>
+              </a:rPr>
+              <a:t>[[2]] %in% </a:t>
+            </a:r>
+            <a:r>
+              <a:rPr lang="en-US" sz="1100" dirty="0" err="1">
+                <a:latin typeface="Courier New" panose="02070309020205020404" pitchFamily="49" charset="0"/>
+                <a:cs typeface="Courier New" panose="02070309020205020404" pitchFamily="49" charset="0"/>
+              </a:rPr>
+              <a:t>numericCols</a:t>
+            </a:r>
+            <a:r>
+              <a:rPr lang="en-US" sz="1100" dirty="0">
+                <a:latin typeface="Courier New" panose="02070309020205020404" pitchFamily="49" charset="0"/>
+                <a:cs typeface="Courier New" panose="02070309020205020404" pitchFamily="49" charset="0"/>
+              </a:rPr>
+              <a:t> # These numeric columns need to be scaled</a:t>
+            </a:r>
+          </a:p>
+          <a:p>
+            <a:r>
+              <a:rPr lang="en-US" sz="1100" dirty="0">
+                <a:latin typeface="Courier New" panose="02070309020205020404" pitchFamily="49" charset="0"/>
+                <a:cs typeface="Courier New" panose="02070309020205020404" pitchFamily="49" charset="0"/>
+              </a:rPr>
+              <a:t>    # Already scaled in cleaning</a:t>
+            </a:r>
+          </a:p>
+          <a:p>
+            <a:r>
+              <a:rPr lang="en-US" sz="1100" dirty="0">
+                <a:latin typeface="Courier New" panose="02070309020205020404" pitchFamily="49" charset="0"/>
+                <a:cs typeface="Courier New" panose="02070309020205020404" pitchFamily="49" charset="0"/>
+              </a:rPr>
+              <a:t>    </a:t>
+            </a:r>
+            <a:r>
+              <a:rPr lang="en-US" sz="1100" dirty="0" err="1">
+                <a:latin typeface="Courier New" panose="02070309020205020404" pitchFamily="49" charset="0"/>
+                <a:cs typeface="Courier New" panose="02070309020205020404" pitchFamily="49" charset="0"/>
+              </a:rPr>
+              <a:t>mod.svr</a:t>
+            </a:r>
+            <a:r>
+              <a:rPr lang="en-US" sz="1100" dirty="0">
+                <a:latin typeface="Courier New" panose="02070309020205020404" pitchFamily="49" charset="0"/>
+                <a:cs typeface="Courier New" panose="02070309020205020404" pitchFamily="49" charset="0"/>
+              </a:rPr>
+              <a:t> &lt;- </a:t>
+            </a:r>
+            <a:r>
+              <a:rPr lang="en-US" sz="1100" dirty="0" err="1">
+                <a:latin typeface="Courier New" panose="02070309020205020404" pitchFamily="49" charset="0"/>
+                <a:cs typeface="Courier New" panose="02070309020205020404" pitchFamily="49" charset="0"/>
+              </a:rPr>
+              <a:t>svm</a:t>
+            </a:r>
+            <a:r>
+              <a:rPr lang="en-US" sz="1100" dirty="0">
+                <a:latin typeface="Courier New" panose="02070309020205020404" pitchFamily="49" charset="0"/>
+                <a:cs typeface="Courier New" panose="02070309020205020404" pitchFamily="49" charset="0"/>
+              </a:rPr>
+              <a:t>(x = </a:t>
+            </a:r>
+            <a:r>
+              <a:rPr lang="en-US" sz="1100" dirty="0" err="1">
+                <a:latin typeface="Courier New" panose="02070309020205020404" pitchFamily="49" charset="0"/>
+                <a:cs typeface="Courier New" panose="02070309020205020404" pitchFamily="49" charset="0"/>
+              </a:rPr>
+              <a:t>Xtrain</a:t>
+            </a:r>
+            <a:r>
+              <a:rPr lang="en-US" sz="1100" dirty="0">
+                <a:latin typeface="Courier New" panose="02070309020205020404" pitchFamily="49" charset="0"/>
+                <a:cs typeface="Courier New" panose="02070309020205020404" pitchFamily="49" charset="0"/>
+              </a:rPr>
+              <a:t>, y = outcomes[</a:t>
+            </a:r>
+            <a:r>
+              <a:rPr lang="en-US" sz="1100" dirty="0" err="1">
+                <a:latin typeface="Courier New" panose="02070309020205020404" pitchFamily="49" charset="0"/>
+                <a:cs typeface="Courier New" panose="02070309020205020404" pitchFamily="49" charset="0"/>
+              </a:rPr>
+              <a:t>itr</a:t>
+            </a:r>
+            <a:r>
+              <a:rPr lang="en-US" sz="1100" dirty="0">
+                <a:latin typeface="Courier New" panose="02070309020205020404" pitchFamily="49" charset="0"/>
+                <a:cs typeface="Courier New" panose="02070309020205020404" pitchFamily="49" charset="0"/>
+              </a:rPr>
+              <a:t>], type = "eps-regression", kernel = "radial",</a:t>
+            </a:r>
+          </a:p>
+          <a:p>
+            <a:r>
+              <a:rPr lang="en-US" sz="1100" dirty="0">
+                <a:latin typeface="Courier New" panose="02070309020205020404" pitchFamily="49" charset="0"/>
+                <a:cs typeface="Courier New" panose="02070309020205020404" pitchFamily="49" charset="0"/>
+              </a:rPr>
+              <a:t>                   cost = cost, gamma = gamma, epsilon = epsilon, scale = FALSE)</a:t>
+            </a:r>
+          </a:p>
+          <a:p>
+            <a:r>
+              <a:rPr lang="en-US" sz="1100" dirty="0">
+                <a:latin typeface="Courier New" panose="02070309020205020404" pitchFamily="49" charset="0"/>
+                <a:cs typeface="Courier New" panose="02070309020205020404" pitchFamily="49" charset="0"/>
+              </a:rPr>
+              <a:t>    # Predict on validation set</a:t>
+            </a:r>
+          </a:p>
+          <a:p>
+            <a:r>
+              <a:rPr lang="en-US" sz="1100" dirty="0">
+                <a:latin typeface="Courier New" panose="02070309020205020404" pitchFamily="49" charset="0"/>
+                <a:cs typeface="Courier New" panose="02070309020205020404" pitchFamily="49" charset="0"/>
+              </a:rPr>
+              <a:t>    </a:t>
+            </a:r>
+            <a:r>
+              <a:rPr lang="en-US" sz="1100" dirty="0" err="1">
+                <a:latin typeface="Courier New" panose="02070309020205020404" pitchFamily="49" charset="0"/>
+                <a:cs typeface="Courier New" panose="02070309020205020404" pitchFamily="49" charset="0"/>
+              </a:rPr>
+              <a:t>predValid</a:t>
+            </a:r>
+            <a:r>
+              <a:rPr lang="en-US" sz="1100" dirty="0">
+                <a:latin typeface="Courier New" panose="02070309020205020404" pitchFamily="49" charset="0"/>
+                <a:cs typeface="Courier New" panose="02070309020205020404" pitchFamily="49" charset="0"/>
+              </a:rPr>
+              <a:t> &lt;- predict(</a:t>
+            </a:r>
+            <a:r>
+              <a:rPr lang="en-US" sz="1100" dirty="0" err="1">
+                <a:latin typeface="Courier New" panose="02070309020205020404" pitchFamily="49" charset="0"/>
+                <a:cs typeface="Courier New" panose="02070309020205020404" pitchFamily="49" charset="0"/>
+              </a:rPr>
+              <a:t>mod.svr</a:t>
+            </a:r>
+            <a:r>
+              <a:rPr lang="en-US" sz="1100" dirty="0">
+                <a:latin typeface="Courier New" panose="02070309020205020404" pitchFamily="49" charset="0"/>
+                <a:cs typeface="Courier New" panose="02070309020205020404" pitchFamily="49" charset="0"/>
+              </a:rPr>
+              <a:t>, </a:t>
+            </a:r>
+            <a:r>
+              <a:rPr lang="en-US" sz="1100" dirty="0" err="1">
+                <a:latin typeface="Courier New" panose="02070309020205020404" pitchFamily="49" charset="0"/>
+                <a:cs typeface="Courier New" panose="02070309020205020404" pitchFamily="49" charset="0"/>
+              </a:rPr>
+              <a:t>newdata</a:t>
+            </a:r>
+            <a:r>
+              <a:rPr lang="en-US" sz="1100" dirty="0">
+                <a:latin typeface="Courier New" panose="02070309020205020404" pitchFamily="49" charset="0"/>
+                <a:cs typeface="Courier New" panose="02070309020205020404" pitchFamily="49" charset="0"/>
+              </a:rPr>
+              <a:t> = </a:t>
+            </a:r>
+            <a:r>
+              <a:rPr lang="en-US" sz="1100" dirty="0" err="1">
+                <a:latin typeface="Courier New" panose="02070309020205020404" pitchFamily="49" charset="0"/>
+                <a:cs typeface="Courier New" panose="02070309020205020404" pitchFamily="49" charset="0"/>
+              </a:rPr>
+              <a:t>Xvalid</a:t>
+            </a:r>
+            <a:r>
+              <a:rPr lang="en-US" sz="1100" dirty="0">
+                <a:latin typeface="Courier New" panose="02070309020205020404" pitchFamily="49" charset="0"/>
+                <a:cs typeface="Courier New" panose="02070309020205020404" pitchFamily="49" charset="0"/>
+              </a:rPr>
+              <a:t>)</a:t>
+            </a:r>
+          </a:p>
+          <a:p>
+            <a:r>
+              <a:rPr lang="en-US" sz="1100" dirty="0">
+                <a:latin typeface="Courier New" panose="02070309020205020404" pitchFamily="49" charset="0"/>
+                <a:cs typeface="Courier New" panose="02070309020205020404" pitchFamily="49" charset="0"/>
+              </a:rPr>
+              <a:t>    </a:t>
+            </a:r>
+          </a:p>
+          <a:p>
+            <a:r>
+              <a:rPr lang="en-US" sz="1100" dirty="0">
+                <a:latin typeface="Courier New" panose="02070309020205020404" pitchFamily="49" charset="0"/>
+                <a:cs typeface="Courier New" panose="02070309020205020404" pitchFamily="49" charset="0"/>
+              </a:rPr>
+              <a:t>    # Compute RMSE</a:t>
+            </a:r>
+          </a:p>
+          <a:p>
+            <a:r>
+              <a:rPr lang="en-US" sz="1100" dirty="0">
+                <a:latin typeface="Courier New" panose="02070309020205020404" pitchFamily="49" charset="0"/>
+                <a:cs typeface="Courier New" panose="02070309020205020404" pitchFamily="49" charset="0"/>
+              </a:rPr>
+              <a:t>    </a:t>
+            </a:r>
+            <a:r>
+              <a:rPr lang="en-US" sz="1100" dirty="0" err="1">
+                <a:latin typeface="Courier New" panose="02070309020205020404" pitchFamily="49" charset="0"/>
+                <a:cs typeface="Courier New" panose="02070309020205020404" pitchFamily="49" charset="0"/>
+              </a:rPr>
+              <a:t>errMetric</a:t>
+            </a:r>
+            <a:r>
+              <a:rPr lang="en-US" sz="1100" dirty="0">
+                <a:latin typeface="Courier New" panose="02070309020205020404" pitchFamily="49" charset="0"/>
+                <a:cs typeface="Courier New" panose="02070309020205020404" pitchFamily="49" charset="0"/>
+              </a:rPr>
+              <a:t> &lt;- sqrt(mean((</a:t>
+            </a:r>
+            <a:r>
+              <a:rPr lang="en-US" sz="1100" dirty="0" err="1">
+                <a:latin typeface="Courier New" panose="02070309020205020404" pitchFamily="49" charset="0"/>
+                <a:cs typeface="Courier New" panose="02070309020205020404" pitchFamily="49" charset="0"/>
+              </a:rPr>
+              <a:t>predValid</a:t>
+            </a:r>
+            <a:r>
+              <a:rPr lang="en-US" sz="1100" dirty="0">
+                <a:latin typeface="Courier New" panose="02070309020205020404" pitchFamily="49" charset="0"/>
+                <a:cs typeface="Courier New" panose="02070309020205020404" pitchFamily="49" charset="0"/>
+              </a:rPr>
+              <a:t>-outcomes[-</a:t>
+            </a:r>
+            <a:r>
+              <a:rPr lang="en-US" sz="1100" dirty="0" err="1">
+                <a:latin typeface="Courier New" panose="02070309020205020404" pitchFamily="49" charset="0"/>
+                <a:cs typeface="Courier New" panose="02070309020205020404" pitchFamily="49" charset="0"/>
+              </a:rPr>
+              <a:t>itr</a:t>
+            </a:r>
+            <a:r>
+              <a:rPr lang="en-US" sz="1100" dirty="0">
+                <a:latin typeface="Courier New" panose="02070309020205020404" pitchFamily="49" charset="0"/>
+                <a:cs typeface="Courier New" panose="02070309020205020404" pitchFamily="49" charset="0"/>
+              </a:rPr>
+              <a:t>])^2)) # Compute RMSE</a:t>
+            </a:r>
+          </a:p>
+          <a:p>
+            <a:r>
+              <a:rPr lang="en-US" sz="1100" dirty="0">
+                <a:latin typeface="Courier New" panose="02070309020205020404" pitchFamily="49" charset="0"/>
+                <a:cs typeface="Courier New" panose="02070309020205020404" pitchFamily="49" charset="0"/>
+              </a:rPr>
+              <a:t>    </a:t>
+            </a:r>
+            <a:r>
+              <a:rPr lang="en-US" sz="1100" dirty="0" err="1">
+                <a:latin typeface="Courier New" panose="02070309020205020404" pitchFamily="49" charset="0"/>
+                <a:cs typeface="Courier New" panose="02070309020205020404" pitchFamily="49" charset="0"/>
+              </a:rPr>
+              <a:t>rmse</a:t>
+            </a:r>
+            <a:r>
+              <a:rPr lang="en-US" sz="1100" dirty="0">
+                <a:latin typeface="Courier New" panose="02070309020205020404" pitchFamily="49" charset="0"/>
+                <a:cs typeface="Courier New" panose="02070309020205020404" pitchFamily="49" charset="0"/>
+              </a:rPr>
+              <a:t> &lt;- c(</a:t>
+            </a:r>
+            <a:r>
+              <a:rPr lang="en-US" sz="1100" dirty="0" err="1">
+                <a:latin typeface="Courier New" panose="02070309020205020404" pitchFamily="49" charset="0"/>
+                <a:cs typeface="Courier New" panose="02070309020205020404" pitchFamily="49" charset="0"/>
+              </a:rPr>
+              <a:t>rmse,errMetric</a:t>
+            </a:r>
+            <a:r>
+              <a:rPr lang="en-US" sz="1100" dirty="0">
+                <a:latin typeface="Courier New" panose="02070309020205020404" pitchFamily="49" charset="0"/>
+                <a:cs typeface="Courier New" panose="02070309020205020404" pitchFamily="49" charset="0"/>
+              </a:rPr>
+              <a:t>) # Append</a:t>
+            </a:r>
+          </a:p>
+          <a:p>
+            <a:r>
+              <a:rPr lang="en-US" sz="1100" dirty="0">
+                <a:latin typeface="Courier New" panose="02070309020205020404" pitchFamily="49" charset="0"/>
+                <a:cs typeface="Courier New" panose="02070309020205020404" pitchFamily="49" charset="0"/>
+              </a:rPr>
+              <a:t>    # Write report</a:t>
+            </a:r>
+          </a:p>
+          <a:p>
+            <a:r>
+              <a:rPr lang="en-US" sz="1100" dirty="0">
+                <a:latin typeface="Courier New" panose="02070309020205020404" pitchFamily="49" charset="0"/>
+                <a:cs typeface="Courier New" panose="02070309020205020404" pitchFamily="49" charset="0"/>
+              </a:rPr>
+              <a:t>    cat("Model :: ", "gamma = ", gamma, "cost = ", cost, "epsilon = ", epsilon, ":: RMSE = ", </a:t>
+            </a:r>
+            <a:r>
+              <a:rPr lang="en-US" sz="1100" dirty="0" err="1">
+                <a:latin typeface="Courier New" panose="02070309020205020404" pitchFamily="49" charset="0"/>
+                <a:cs typeface="Courier New" panose="02070309020205020404" pitchFamily="49" charset="0"/>
+              </a:rPr>
+              <a:t>errMetric</a:t>
+            </a:r>
+            <a:r>
+              <a:rPr lang="en-US" sz="1100" dirty="0">
+                <a:latin typeface="Courier New" panose="02070309020205020404" pitchFamily="49" charset="0"/>
+                <a:cs typeface="Courier New" panose="02070309020205020404" pitchFamily="49" charset="0"/>
+              </a:rPr>
+              <a:t>, "\n")</a:t>
+            </a:r>
+          </a:p>
+          <a:p>
+            <a:r>
+              <a:rPr lang="en-US" sz="1100" dirty="0">
+                <a:latin typeface="Courier New" panose="02070309020205020404" pitchFamily="49" charset="0"/>
+                <a:cs typeface="Courier New" panose="02070309020205020404" pitchFamily="49" charset="0"/>
+              </a:rPr>
+              <a:t>  }</a:t>
+            </a:r>
+          </a:p>
+          <a:p>
+            <a:r>
+              <a:rPr lang="en-US" sz="1100" dirty="0">
+                <a:latin typeface="Courier New" panose="02070309020205020404" pitchFamily="49" charset="0"/>
+                <a:cs typeface="Courier New" panose="02070309020205020404" pitchFamily="49" charset="0"/>
+              </a:rPr>
+              <a:t>  </a:t>
+            </a:r>
+          </a:p>
+          <a:p>
+            <a:r>
+              <a:rPr lang="en-US" sz="1100" dirty="0">
+                <a:latin typeface="Courier New" panose="02070309020205020404" pitchFamily="49" charset="0"/>
+                <a:cs typeface="Courier New" panose="02070309020205020404" pitchFamily="49" charset="0"/>
+              </a:rPr>
+              <a:t>  # Return the </a:t>
+            </a:r>
+            <a:r>
+              <a:rPr lang="en-US" sz="1100" dirty="0" err="1">
+                <a:latin typeface="Courier New" panose="02070309020205020404" pitchFamily="49" charset="0"/>
+                <a:cs typeface="Courier New" panose="02070309020205020404" pitchFamily="49" charset="0"/>
+              </a:rPr>
+              <a:t>rmse</a:t>
+            </a:r>
+            <a:r>
+              <a:rPr lang="en-US" sz="1100" dirty="0">
+                <a:latin typeface="Courier New" panose="02070309020205020404" pitchFamily="49" charset="0"/>
+                <a:cs typeface="Courier New" panose="02070309020205020404" pitchFamily="49" charset="0"/>
+              </a:rPr>
+              <a:t> vector</a:t>
+            </a:r>
+          </a:p>
+          <a:p>
+            <a:r>
+              <a:rPr lang="en-US" sz="1100" dirty="0">
+                <a:latin typeface="Courier New" panose="02070309020205020404" pitchFamily="49" charset="0"/>
+                <a:cs typeface="Courier New" panose="02070309020205020404" pitchFamily="49" charset="0"/>
+              </a:rPr>
+              <a:t>  </a:t>
+            </a:r>
+            <a:r>
+              <a:rPr lang="en-US" sz="1100" dirty="0" err="1">
+                <a:latin typeface="Courier New" panose="02070309020205020404" pitchFamily="49" charset="0"/>
+                <a:cs typeface="Courier New" panose="02070309020205020404" pitchFamily="49" charset="0"/>
+              </a:rPr>
+              <a:t>rmse</a:t>
+            </a:r>
+            <a:endParaRPr lang="en-US" sz="1100" dirty="0">
+              <a:latin typeface="Courier New" panose="02070309020205020404" pitchFamily="49" charset="0"/>
+              <a:cs typeface="Courier New" panose="02070309020205020404" pitchFamily="49" charset="0"/>
+            </a:endParaRPr>
+          </a:p>
+          <a:p>
+            <a:r>
+              <a:rPr lang="en-US" sz="1100" dirty="0">
+                <a:latin typeface="Courier New" panose="02070309020205020404" pitchFamily="49" charset="0"/>
+                <a:cs typeface="Courier New" panose="02070309020205020404" pitchFamily="49" charset="0"/>
+              </a:rPr>
+              <a:t>}</a:t>
+            </a:r>
+          </a:p>
+        </p:txBody>
+      </p:sp>
+    </p:spTree>
+    <p:extLst>
+      <p:ext uri="{BB962C8B-B14F-4D97-AF65-F5344CB8AC3E}">
+        <p14:creationId xmlns:p14="http://schemas.microsoft.com/office/powerpoint/2010/main" val="218937461"/>
+      </p:ext>
+    </p:extLst>
+  </p:cSld>
+  <p:clrMapOvr>
+    <a:masterClrMapping/>
+  </p:clrMapOvr>
+</p:sld>
+</file>
+
+<file path=ppt/slides/slide9.xml><?xml version="1.0" encoding="utf-8"?>
+<p:sld xmlns:a="http://schemas.openxmlformats.org/drawingml/2006/main" xmlns:r="http://schemas.openxmlformats.org/officeDocument/2006/relationships" xmlns:p="http://schemas.openxmlformats.org/presentationml/2006/main">
+  <p:cSld>
+    <p:spTree>
+      <p:nvGrpSpPr>
+        <p:cNvPr id="1" name=""/>
+        <p:cNvGrpSpPr/>
+        <p:nvPr/>
+      </p:nvGrpSpPr>
+      <p:grpSpPr>
+        <a:xfrm>
+          <a:off x="0" y="0"/>
+          <a:ext cx="0" cy="0"/>
+          <a:chOff x="0" y="0"/>
+          <a:chExt cx="0" cy="0"/>
+        </a:xfrm>
+      </p:grpSpPr>
+      <p:sp>
+        <p:nvSpPr>
+          <p:cNvPr id="4" name="TextBox 3">
             <a:extLst>
               <a:ext uri="{FF2B5EF4-FFF2-40B4-BE49-F238E27FC236}">
-                <a16:creationId xmlns:a16="http://schemas.microsoft.com/office/drawing/2014/main" id="{7DC80D4E-9338-408B-9BE1-FE6E64398997}"/>
+                <a16:creationId xmlns:a16="http://schemas.microsoft.com/office/drawing/2014/main" id="{A2E4A1D5-16F1-4A95-BEA0-40421DA39F89}"/>
               </a:ext>
             </a:extLst>
           </p:cNvPr>
-          <p:cNvSpPr>
-            <a:spLocks noGrp="1"/>
-          </p:cNvSpPr>
-          <p:nvPr>
-            <p:ph idx="1"/>
-          </p:nvPr>
-        </p:nvSpPr>
-        <p:spPr/>
-        <p:txBody>
-          <a:bodyPr/>
+          <p:cNvSpPr txBox="1"/>
+          <p:nvPr/>
+        </p:nvSpPr>
+        <p:spPr>
+          <a:xfrm>
+            <a:off x="1037690" y="1715785"/>
+            <a:ext cx="8669361" cy="2677656"/>
+          </a:xfrm>
+          <a:prstGeom prst="rect">
+            <a:avLst/>
+          </a:prstGeom>
+          <a:noFill/>
+        </p:spPr>
+        <p:txBody>
+          <a:bodyPr wrap="none" rtlCol="0">
+            <a:spAutoFit/>
+          </a:bodyPr>
           <a:lstStyle/>
           <a:p>
-            <a:pPr marL="225425" indent="-225425">
-              <a:buFont typeface="Courier New" panose="02070309020205020404" pitchFamily="49" charset="0"/>
-              <a:buChar char="o"/>
-            </a:pPr>
-            <a:r>
-              <a:rPr lang="en-US" dirty="0"/>
-              <a:t>In </a:t>
-            </a:r>
-            <a:r>
-              <a:rPr lang="en-US" dirty="0">
-                <a:solidFill>
-                  <a:srgbClr val="00B050"/>
-                </a:solidFill>
-              </a:rPr>
-              <a:t>boosting methods</a:t>
-            </a:r>
-            <a:r>
-              <a:rPr lang="en-US" dirty="0"/>
-              <a:t>, several instance of the same base model are trained sequentially such that, at each iteration, the way to train the current weak learner depends on the previous weak learners and more especially on how they are performing on the data</a:t>
-            </a:r>
-          </a:p>
-          <a:p>
-            <a:pPr marL="518033" lvl="1" indent="-225425">
-              <a:buFont typeface="Courier New" panose="02070309020205020404" pitchFamily="49" charset="0"/>
-              <a:buChar char="o"/>
-            </a:pPr>
-            <a:r>
-              <a:rPr lang="en-US" dirty="0"/>
-              <a:t>This iterative strategy of learning used in boosting methods, that adapts to the weaknesses of the previous models to train the current one, mainly allows us to get an ensemble model with a lower bias than its components: that is why weak learners with low variance but high bias are well adapted for boosting</a:t>
-            </a:r>
-          </a:p>
-          <a:p>
-            <a:pPr marL="225425" indent="-225425">
-              <a:buFont typeface="Courier New" panose="02070309020205020404" pitchFamily="49" charset="0"/>
-              <a:buChar char="o"/>
-            </a:pPr>
-            <a:r>
-              <a:rPr lang="en-US" dirty="0"/>
-              <a:t>In </a:t>
-            </a:r>
-            <a:r>
-              <a:rPr lang="en-US" dirty="0">
-                <a:solidFill>
-                  <a:srgbClr val="00B050"/>
-                </a:solidFill>
-              </a:rPr>
-              <a:t>stacking methods</a:t>
-            </a:r>
-            <a:r>
-              <a:rPr lang="en-US" dirty="0"/>
-              <a:t>, different weak learners are fitted independently from each others and a meta-model is trained on top of that to predict outputs based on the outputs returned by the base models</a:t>
-            </a:r>
-          </a:p>
-          <a:p>
-            <a:endParaRPr lang="en-US" dirty="0"/>
+            <a:r>
+              <a:rPr lang="en-US" sz="1400" dirty="0">
+                <a:latin typeface="Courier New" panose="02070309020205020404" pitchFamily="49" charset="0"/>
+                <a:cs typeface="Courier New" panose="02070309020205020404" pitchFamily="49" charset="0"/>
+              </a:rPr>
+              <a:t># Loop over the </a:t>
+            </a:r>
+            <a:r>
+              <a:rPr lang="en-US" sz="1400" dirty="0" err="1">
+                <a:latin typeface="Courier New" panose="02070309020205020404" pitchFamily="49" charset="0"/>
+                <a:cs typeface="Courier New" panose="02070309020205020404" pitchFamily="49" charset="0"/>
+              </a:rPr>
+              <a:t>svm_grid</a:t>
+            </a:r>
+            <a:r>
+              <a:rPr lang="en-US" sz="1400" dirty="0">
+                <a:latin typeface="Courier New" panose="02070309020205020404" pitchFamily="49" charset="0"/>
+                <a:cs typeface="Courier New" panose="02070309020205020404" pitchFamily="49" charset="0"/>
+              </a:rPr>
+              <a:t> to screen best hyperparameters</a:t>
+            </a:r>
+          </a:p>
+          <a:p>
+            <a:endParaRPr lang="en-US" sz="1400" dirty="0">
+              <a:latin typeface="Courier New" panose="02070309020205020404" pitchFamily="49" charset="0"/>
+              <a:cs typeface="Courier New" panose="02070309020205020404" pitchFamily="49" charset="0"/>
+            </a:endParaRPr>
+          </a:p>
+          <a:p>
+            <a:r>
+              <a:rPr lang="en-US" sz="1400" dirty="0" err="1">
+                <a:latin typeface="Courier New" panose="02070309020205020404" pitchFamily="49" charset="0"/>
+                <a:cs typeface="Courier New" panose="02070309020205020404" pitchFamily="49" charset="0"/>
+              </a:rPr>
+              <a:t>cv.results</a:t>
+            </a:r>
+            <a:r>
+              <a:rPr lang="en-US" sz="1400" dirty="0">
+                <a:latin typeface="Courier New" panose="02070309020205020404" pitchFamily="49" charset="0"/>
+                <a:cs typeface="Courier New" panose="02070309020205020404" pitchFamily="49" charset="0"/>
+              </a:rPr>
+              <a:t> &lt;- </a:t>
+            </a:r>
+            <a:r>
+              <a:rPr lang="en-US" sz="1400" dirty="0" err="1">
+                <a:latin typeface="Courier New" panose="02070309020205020404" pitchFamily="49" charset="0"/>
+                <a:cs typeface="Courier New" panose="02070309020205020404" pitchFamily="49" charset="0"/>
+              </a:rPr>
+              <a:t>data.frame</a:t>
+            </a:r>
+            <a:r>
+              <a:rPr lang="en-US" sz="1400" dirty="0">
+                <a:latin typeface="Courier New" panose="02070309020205020404" pitchFamily="49" charset="0"/>
+                <a:cs typeface="Courier New" panose="02070309020205020404" pitchFamily="49" charset="0"/>
+              </a:rPr>
+              <a:t>(</a:t>
+            </a:r>
+            <a:r>
+              <a:rPr lang="en-US" sz="1400" dirty="0" err="1">
+                <a:latin typeface="Courier New" panose="02070309020205020404" pitchFamily="49" charset="0"/>
+                <a:cs typeface="Courier New" panose="02070309020205020404" pitchFamily="49" charset="0"/>
+              </a:rPr>
+              <a:t>svm_grid</a:t>
+            </a:r>
+            <a:r>
+              <a:rPr lang="en-US" sz="1400" dirty="0">
+                <a:latin typeface="Courier New" panose="02070309020205020404" pitchFamily="49" charset="0"/>
+                <a:cs typeface="Courier New" panose="02070309020205020404" pitchFamily="49" charset="0"/>
+              </a:rPr>
+              <a:t>); </a:t>
+            </a:r>
+            <a:r>
+              <a:rPr lang="en-US" sz="1400" dirty="0" err="1">
+                <a:latin typeface="Courier New" panose="02070309020205020404" pitchFamily="49" charset="0"/>
+                <a:cs typeface="Courier New" panose="02070309020205020404" pitchFamily="49" charset="0"/>
+              </a:rPr>
+              <a:t>cv.results$RMSE</a:t>
+            </a:r>
+            <a:r>
+              <a:rPr lang="en-US" sz="1400" dirty="0">
+                <a:latin typeface="Courier New" panose="02070309020205020404" pitchFamily="49" charset="0"/>
+                <a:cs typeface="Courier New" panose="02070309020205020404" pitchFamily="49" charset="0"/>
+              </a:rPr>
+              <a:t> = 0</a:t>
+            </a:r>
+          </a:p>
+          <a:p>
+            <a:r>
+              <a:rPr lang="en-US" sz="1400" dirty="0">
+                <a:latin typeface="Courier New" panose="02070309020205020404" pitchFamily="49" charset="0"/>
+                <a:cs typeface="Courier New" panose="02070309020205020404" pitchFamily="49" charset="0"/>
+              </a:rPr>
+              <a:t>for (</a:t>
+            </a:r>
+            <a:r>
+              <a:rPr lang="en-US" sz="1400" dirty="0" err="1">
+                <a:latin typeface="Courier New" panose="02070309020205020404" pitchFamily="49" charset="0"/>
+                <a:cs typeface="Courier New" panose="02070309020205020404" pitchFamily="49" charset="0"/>
+              </a:rPr>
+              <a:t>ind</a:t>
+            </a:r>
+            <a:r>
+              <a:rPr lang="en-US" sz="1400" dirty="0">
+                <a:latin typeface="Courier New" panose="02070309020205020404" pitchFamily="49" charset="0"/>
+                <a:cs typeface="Courier New" panose="02070309020205020404" pitchFamily="49" charset="0"/>
+              </a:rPr>
+              <a:t> in 1:dim(</a:t>
+            </a:r>
+            <a:r>
+              <a:rPr lang="en-US" sz="1400" dirty="0" err="1">
+                <a:latin typeface="Courier New" panose="02070309020205020404" pitchFamily="49" charset="0"/>
+                <a:cs typeface="Courier New" panose="02070309020205020404" pitchFamily="49" charset="0"/>
+              </a:rPr>
+              <a:t>svm_grid</a:t>
+            </a:r>
+            <a:r>
+              <a:rPr lang="en-US" sz="1400" dirty="0">
+                <a:latin typeface="Courier New" panose="02070309020205020404" pitchFamily="49" charset="0"/>
+                <a:cs typeface="Courier New" panose="02070309020205020404" pitchFamily="49" charset="0"/>
+              </a:rPr>
+              <a:t>)[1]){</a:t>
+            </a:r>
+          </a:p>
+          <a:p>
+            <a:r>
+              <a:rPr lang="en-US" sz="1400" dirty="0">
+                <a:latin typeface="Courier New" panose="02070309020205020404" pitchFamily="49" charset="0"/>
+                <a:cs typeface="Courier New" panose="02070309020205020404" pitchFamily="49" charset="0"/>
+              </a:rPr>
+              <a:t>  gamma &lt;- </a:t>
+            </a:r>
+            <a:r>
+              <a:rPr lang="en-US" sz="1400" dirty="0" err="1">
+                <a:latin typeface="Courier New" panose="02070309020205020404" pitchFamily="49" charset="0"/>
+                <a:cs typeface="Courier New" panose="02070309020205020404" pitchFamily="49" charset="0"/>
+              </a:rPr>
+              <a:t>svm_grid</a:t>
+            </a:r>
+            <a:r>
+              <a:rPr lang="en-US" sz="1400" dirty="0">
+                <a:latin typeface="Courier New" panose="02070309020205020404" pitchFamily="49" charset="0"/>
+                <a:cs typeface="Courier New" panose="02070309020205020404" pitchFamily="49" charset="0"/>
+              </a:rPr>
+              <a:t>[ind,1]; cost &lt;- </a:t>
+            </a:r>
+            <a:r>
+              <a:rPr lang="en-US" sz="1400" dirty="0" err="1">
+                <a:latin typeface="Courier New" panose="02070309020205020404" pitchFamily="49" charset="0"/>
+                <a:cs typeface="Courier New" panose="02070309020205020404" pitchFamily="49" charset="0"/>
+              </a:rPr>
+              <a:t>svm_grid</a:t>
+            </a:r>
+            <a:r>
+              <a:rPr lang="en-US" sz="1400" dirty="0">
+                <a:latin typeface="Courier New" panose="02070309020205020404" pitchFamily="49" charset="0"/>
+                <a:cs typeface="Courier New" panose="02070309020205020404" pitchFamily="49" charset="0"/>
+              </a:rPr>
+              <a:t>[ind,2]; epsilon &lt;- </a:t>
+            </a:r>
+            <a:r>
+              <a:rPr lang="en-US" sz="1400" dirty="0" err="1">
+                <a:latin typeface="Courier New" panose="02070309020205020404" pitchFamily="49" charset="0"/>
+                <a:cs typeface="Courier New" panose="02070309020205020404" pitchFamily="49" charset="0"/>
+              </a:rPr>
+              <a:t>svm_grid</a:t>
+            </a:r>
+            <a:r>
+              <a:rPr lang="en-US" sz="1400" dirty="0">
+                <a:latin typeface="Courier New" panose="02070309020205020404" pitchFamily="49" charset="0"/>
+                <a:cs typeface="Courier New" panose="02070309020205020404" pitchFamily="49" charset="0"/>
+              </a:rPr>
+              <a:t>[ind,3]</a:t>
+            </a:r>
+          </a:p>
+          <a:p>
+            <a:r>
+              <a:rPr lang="en-US" sz="1400" dirty="0">
+                <a:latin typeface="Courier New" panose="02070309020205020404" pitchFamily="49" charset="0"/>
+                <a:cs typeface="Courier New" panose="02070309020205020404" pitchFamily="49" charset="0"/>
+              </a:rPr>
+              <a:t>  # Run fivefold CV</a:t>
+            </a:r>
+          </a:p>
+          <a:p>
+            <a:r>
+              <a:rPr lang="en-US" sz="1400" dirty="0">
+                <a:latin typeface="Courier New" panose="02070309020205020404" pitchFamily="49" charset="0"/>
+                <a:cs typeface="Courier New" panose="02070309020205020404" pitchFamily="49" charset="0"/>
+              </a:rPr>
+              <a:t>  </a:t>
+            </a:r>
+            <a:r>
+              <a:rPr lang="en-US" sz="1400" dirty="0" err="1">
+                <a:latin typeface="Courier New" panose="02070309020205020404" pitchFamily="49" charset="0"/>
+                <a:cs typeface="Courier New" panose="02070309020205020404" pitchFamily="49" charset="0"/>
+              </a:rPr>
+              <a:t>rmse</a:t>
+            </a:r>
+            <a:r>
+              <a:rPr lang="en-US" sz="1400" dirty="0">
+                <a:latin typeface="Courier New" panose="02070309020205020404" pitchFamily="49" charset="0"/>
+                <a:cs typeface="Courier New" panose="02070309020205020404" pitchFamily="49" charset="0"/>
+              </a:rPr>
+              <a:t> &lt;- svm.cv(gamma = gamma, cost = cost, epsilon = epsilon)</a:t>
+            </a:r>
+          </a:p>
+          <a:p>
+            <a:r>
+              <a:rPr lang="en-US" sz="1400" dirty="0">
+                <a:latin typeface="Courier New" panose="02070309020205020404" pitchFamily="49" charset="0"/>
+                <a:cs typeface="Courier New" panose="02070309020205020404" pitchFamily="49" charset="0"/>
+              </a:rPr>
+              <a:t>  # Save the mean to </a:t>
+            </a:r>
+            <a:r>
+              <a:rPr lang="en-US" sz="1400" dirty="0" err="1">
+                <a:latin typeface="Courier New" panose="02070309020205020404" pitchFamily="49" charset="0"/>
+                <a:cs typeface="Courier New" panose="02070309020205020404" pitchFamily="49" charset="0"/>
+              </a:rPr>
+              <a:t>cv.results</a:t>
+            </a:r>
+            <a:endParaRPr lang="en-US" sz="1400" dirty="0">
+              <a:latin typeface="Courier New" panose="02070309020205020404" pitchFamily="49" charset="0"/>
+              <a:cs typeface="Courier New" panose="02070309020205020404" pitchFamily="49" charset="0"/>
+            </a:endParaRPr>
+          </a:p>
+          <a:p>
+            <a:r>
+              <a:rPr lang="en-US" sz="1400" dirty="0">
+                <a:latin typeface="Courier New" panose="02070309020205020404" pitchFamily="49" charset="0"/>
+                <a:cs typeface="Courier New" panose="02070309020205020404" pitchFamily="49" charset="0"/>
+              </a:rPr>
+              <a:t>  </a:t>
+            </a:r>
+            <a:r>
+              <a:rPr lang="en-US" sz="1400" dirty="0" err="1">
+                <a:latin typeface="Courier New" panose="02070309020205020404" pitchFamily="49" charset="0"/>
+                <a:cs typeface="Courier New" panose="02070309020205020404" pitchFamily="49" charset="0"/>
+              </a:rPr>
+              <a:t>cv.results</a:t>
+            </a:r>
+            <a:r>
+              <a:rPr lang="en-US" sz="1400" dirty="0">
+                <a:latin typeface="Courier New" panose="02070309020205020404" pitchFamily="49" charset="0"/>
+                <a:cs typeface="Courier New" panose="02070309020205020404" pitchFamily="49" charset="0"/>
+              </a:rPr>
+              <a:t>[ind,4] &lt;- mean(</a:t>
+            </a:r>
+            <a:r>
+              <a:rPr lang="en-US" sz="1400" dirty="0" err="1">
+                <a:latin typeface="Courier New" panose="02070309020205020404" pitchFamily="49" charset="0"/>
+                <a:cs typeface="Courier New" panose="02070309020205020404" pitchFamily="49" charset="0"/>
+              </a:rPr>
+              <a:t>rmse</a:t>
+            </a:r>
+            <a:r>
+              <a:rPr lang="en-US" sz="1400" dirty="0">
+                <a:latin typeface="Courier New" panose="02070309020205020404" pitchFamily="49" charset="0"/>
+                <a:cs typeface="Courier New" panose="02070309020205020404" pitchFamily="49" charset="0"/>
+              </a:rPr>
+              <a:t>)</a:t>
+            </a:r>
+          </a:p>
+          <a:p>
+            <a:r>
+              <a:rPr lang="en-US" sz="1400" dirty="0">
+                <a:latin typeface="Courier New" panose="02070309020205020404" pitchFamily="49" charset="0"/>
+                <a:cs typeface="Courier New" panose="02070309020205020404" pitchFamily="49" charset="0"/>
+              </a:rPr>
+              <a:t>}</a:t>
+            </a:r>
+          </a:p>
+          <a:p>
+            <a:endParaRPr lang="en-US" sz="1400" dirty="0">
+              <a:latin typeface="Courier New" panose="02070309020205020404" pitchFamily="49" charset="0"/>
+              <a:cs typeface="Courier New" panose="02070309020205020404" pitchFamily="49" charset="0"/>
+            </a:endParaRPr>
+          </a:p>
+          <a:p>
+            <a:r>
+              <a:rPr lang="en-US" sz="1400" dirty="0">
+                <a:latin typeface="Courier New" panose="02070309020205020404" pitchFamily="49" charset="0"/>
+                <a:cs typeface="Courier New" panose="02070309020205020404" pitchFamily="49" charset="0"/>
+              </a:rPr>
+              <a:t>save(</a:t>
+            </a:r>
+            <a:r>
+              <a:rPr lang="en-US" sz="1400" dirty="0" err="1">
+                <a:latin typeface="Courier New" panose="02070309020205020404" pitchFamily="49" charset="0"/>
+                <a:cs typeface="Courier New" panose="02070309020205020404" pitchFamily="49" charset="0"/>
+              </a:rPr>
+              <a:t>cv.results</a:t>
+            </a:r>
+            <a:r>
+              <a:rPr lang="en-US" sz="1400" dirty="0">
+                <a:latin typeface="Courier New" panose="02070309020205020404" pitchFamily="49" charset="0"/>
+                <a:cs typeface="Courier New" panose="02070309020205020404" pitchFamily="49" charset="0"/>
+              </a:rPr>
+              <a:t>, file="svr_cv5_new.RData")</a:t>
+            </a:r>
           </a:p>
         </p:txBody>
       </p:sp>
     </p:spTree>
     <p:extLst>
       <p:ext uri="{BB962C8B-B14F-4D97-AF65-F5344CB8AC3E}">
-        <p14:creationId xmlns:p14="http://schemas.microsoft.com/office/powerpoint/2010/main" val="2280035547"/>
+        <p14:creationId xmlns:p14="http://schemas.microsoft.com/office/powerpoint/2010/main" val="1966204324"/>
       </p:ext>
     </p:extLst>
   </p:cSld>

</xml_diff>